<commit_message>
Editing Product Picture and Power Point
</commit_message>
<xml_diff>
--- a/PRESENTASI WEBSITE.pptx
+++ b/PRESENTASI WEBSITE.pptx
@@ -2,7 +2,7 @@
 <file path=ppt/presentation.xml><?xml version="1.0" encoding="utf-8"?>
 <p:presentation xmlns:a="http://schemas.openxmlformats.org/drawingml/2006/main" xmlns:r="http://schemas.openxmlformats.org/officeDocument/2006/relationships" xmlns:p="http://schemas.openxmlformats.org/presentationml/2006/main" saveSubsetFonts="1">
   <p:sldMasterIdLst>
-    <p:sldMasterId id="2147483648" r:id="rId1"/>
+    <p:sldMasterId id="2147483744" r:id="rId1"/>
   </p:sldMasterIdLst>
   <p:sldIdLst>
     <p:sldId id="262" r:id="rId2"/>
@@ -111,8 +111,13 @@
 </file>
 
 <file path=ppt/slideLayouts/slideLayout1.xml><?xml version="1.0" encoding="utf-8"?>
-<p:sldLayout xmlns:a="http://schemas.openxmlformats.org/drawingml/2006/main" xmlns:r="http://schemas.openxmlformats.org/officeDocument/2006/relationships" xmlns:p="http://schemas.openxmlformats.org/presentationml/2006/main" type="title" preserve="1">
+<p:sldLayout xmlns:a="http://schemas.openxmlformats.org/drawingml/2006/main" xmlns:r="http://schemas.openxmlformats.org/officeDocument/2006/relationships" xmlns:p="http://schemas.openxmlformats.org/presentationml/2006/main" showMasterSp="0" type="title" preserve="1">
   <p:cSld name="Title Slide">
+    <p:bg>
+      <p:bgRef idx="1002">
+        <a:schemeClr val="bg1"/>
+      </p:bgRef>
+    </p:bg>
     <p:spTree>
       <p:nvGrpSpPr>
         <p:cNvPr id="1" name=""/>
@@ -129,7 +134,126 @@
       </p:grpSpPr>
       <p:sp>
         <p:nvSpPr>
-          <p:cNvPr id="2" name="Title 1"/>
+          <p:cNvPr id="8" name="Rectangle 7"/>
+          <p:cNvSpPr/>
+          <p:nvPr/>
+        </p:nvSpPr>
+        <p:spPr>
+          <a:xfrm flipH="1">
+            <a:off x="2667000" y="0"/>
+            <a:ext cx="6477000" cy="6858000"/>
+          </a:xfrm>
+          <a:prstGeom prst="rect">
+            <a:avLst/>
+          </a:prstGeom>
+          <a:blipFill>
+            <a:blip r:embed="rId2">
+              <a:alphaModFix amt="43000"/>
+            </a:blip>
+            <a:tile tx="0" ty="0" sx="50000" sy="50000" flip="none" algn="tl"/>
+          </a:blipFill>
+          <a:ln w="0" cap="flat" cmpd="sng" algn="ctr">
+            <a:noFill/>
+            <a:prstDash val="solid"/>
+          </a:ln>
+          <a:effectLst>
+            <a:fillOverlay blend="mult">
+              <a:gradFill rotWithShape="1">
+                <a:gsLst>
+                  <a:gs pos="0">
+                    <a:schemeClr val="tx2">
+                      <a:tint val="62000"/>
+                      <a:satMod val="420000"/>
+                    </a:schemeClr>
+                  </a:gs>
+                  <a:gs pos="100000">
+                    <a:schemeClr val="tx2">
+                      <a:shade val="20000"/>
+                      <a:satMod val="170000"/>
+                    </a:schemeClr>
+                  </a:gs>
+                </a:gsLst>
+                <a:path path="circle">
+                  <a:fillToRect l="50000" t="100000" r="50000"/>
+                </a:path>
+                <a:tileRect/>
+              </a:gradFill>
+            </a:fillOverlay>
+            <a:innerShdw blurRad="63500" dist="44450" dir="10800000">
+              <a:srgbClr val="000000">
+                <a:alpha val="50000"/>
+              </a:srgbClr>
+            </a:innerShdw>
+          </a:effectLst>
+        </p:spPr>
+        <p:style>
+          <a:lnRef idx="3">
+            <a:schemeClr val="lt1"/>
+          </a:lnRef>
+          <a:fillRef idx="1">
+            <a:schemeClr val="accent1"/>
+          </a:fillRef>
+          <a:effectRef idx="1">
+            <a:schemeClr val="accent1"/>
+          </a:effectRef>
+          <a:fontRef idx="minor">
+            <a:schemeClr val="lt1"/>
+          </a:fontRef>
+        </p:style>
+        <p:txBody>
+          <a:bodyPr anchor="ctr"/>
+          <a:lstStyle>
+            <a:extLst/>
+          </a:lstStyle>
+          <a:p>
+            <a:pPr algn="ctr" eaLnBrk="1" latinLnBrk="0" hangingPunct="1"/>
+            <a:endParaRPr kumimoji="0" lang="en-US"/>
+          </a:p>
+        </p:txBody>
+      </p:sp>
+      <p:sp>
+        <p:nvSpPr>
+          <p:cNvPr id="9" name="Straight Connector 8"/>
+          <p:cNvSpPr>
+            <a:spLocks noChangeShapeType="1"/>
+          </p:cNvSpPr>
+          <p:nvPr/>
+        </p:nvSpPr>
+        <p:spPr bwMode="auto">
+          <a:xfrm rot="16200000">
+            <a:off x="-762000" y="3429000"/>
+            <a:ext cx="6858000" cy="0"/>
+          </a:xfrm>
+          <a:prstGeom prst="line">
+            <a:avLst/>
+          </a:prstGeom>
+          <a:noFill/>
+          <a:ln w="11430" cap="flat" cmpd="sng" algn="ctr">
+            <a:solidFill>
+              <a:schemeClr val="bg1">
+                <a:shade val="95000"/>
+              </a:schemeClr>
+            </a:solidFill>
+            <a:prstDash val="solid"/>
+            <a:miter lim="800000"/>
+            <a:headEnd type="none" w="med" len="med"/>
+            <a:tailEnd type="none" w="med" len="med"/>
+          </a:ln>
+          <a:effectLst/>
+        </p:spPr>
+        <p:txBody>
+          <a:bodyPr vert="horz" wrap="square" lIns="91440" tIns="45720" rIns="91440" bIns="45720" anchor="t" compatLnSpc="1"/>
+          <a:lstStyle>
+            <a:extLst/>
+          </a:lstStyle>
+          <a:p>
+            <a:endParaRPr kumimoji="0" lang="en-US"/>
+          </a:p>
+        </p:txBody>
+      </p:sp>
+      <p:sp>
+        <p:nvSpPr>
+          <p:cNvPr id="12" name="Title 11"/>
           <p:cNvSpPr>
             <a:spLocks noGrp="1"/>
           </p:cNvSpPr>
@@ -139,25 +263,32 @@
         </p:nvSpPr>
         <p:spPr>
           <a:xfrm>
-            <a:off x="685800" y="2130425"/>
-            <a:ext cx="7772400" cy="1470025"/>
-          </a:xfrm>
-        </p:spPr>
-        <p:txBody>
-          <a:bodyPr/>
-          <a:lstStyle/>
-          <a:p>
-            <a:r>
-              <a:rPr lang="en-US" smtClean="0"/>
+            <a:off x="3366868" y="533400"/>
+            <a:ext cx="5105400" cy="2868168"/>
+          </a:xfrm>
+        </p:spPr>
+        <p:txBody>
+          <a:bodyPr lIns="45720" tIns="0" rIns="45720">
+            <a:noAutofit/>
+          </a:bodyPr>
+          <a:lstStyle>
+            <a:lvl1pPr algn="r">
+              <a:defRPr sz="4200" b="1"/>
+            </a:lvl1pPr>
+            <a:extLst/>
+          </a:lstStyle>
+          <a:p>
+            <a:r>
+              <a:rPr kumimoji="0" lang="en-US" smtClean="0"/>
               <a:t>Click to edit Master title style</a:t>
             </a:r>
-            <a:endParaRPr lang="en-US"/>
-          </a:p>
-        </p:txBody>
-      </p:sp>
-      <p:sp>
-        <p:nvSpPr>
-          <p:cNvPr id="3" name="Subtitle 2"/>
+            <a:endParaRPr kumimoji="0" lang="en-US"/>
+          </a:p>
+        </p:txBody>
+      </p:sp>
+      <p:sp>
+        <p:nvSpPr>
+          <p:cNvPr id="25" name="Subtitle 24"/>
           <p:cNvSpPr>
             <a:spLocks noGrp="1"/>
           </p:cNvSpPr>
@@ -167,132 +298,90 @@
         </p:nvSpPr>
         <p:spPr>
           <a:xfrm>
-            <a:off x="1371600" y="3886200"/>
-            <a:ext cx="6400800" cy="1752600"/>
-          </a:xfrm>
-        </p:spPr>
-        <p:txBody>
-          <a:bodyPr/>
-          <a:lstStyle>
-            <a:lvl1pPr marL="0" indent="0" algn="ctr">
+            <a:off x="3354442" y="3539864"/>
+            <a:ext cx="5114778" cy="1101248"/>
+          </a:xfrm>
+        </p:spPr>
+        <p:txBody>
+          <a:bodyPr lIns="45720" tIns="0" rIns="45720" bIns="0"/>
+          <a:lstStyle>
+            <a:lvl1pPr marL="0" indent="0" algn="r">
               <a:buNone/>
-              <a:defRPr>
+              <a:defRPr sz="2200">
                 <a:solidFill>
-                  <a:schemeClr val="tx1">
-                    <a:tint val="75000"/>
-                  </a:schemeClr>
+                  <a:srgbClr val="FFFFFF"/>
                 </a:solidFill>
+                <a:effectLst/>
               </a:defRPr>
             </a:lvl1pPr>
             <a:lvl2pPr marL="457200" indent="0" algn="ctr">
               <a:buNone/>
-              <a:defRPr>
-                <a:solidFill>
-                  <a:schemeClr val="tx1">
-                    <a:tint val="75000"/>
-                  </a:schemeClr>
-                </a:solidFill>
-              </a:defRPr>
             </a:lvl2pPr>
             <a:lvl3pPr marL="914400" indent="0" algn="ctr">
               <a:buNone/>
-              <a:defRPr>
-                <a:solidFill>
-                  <a:schemeClr val="tx1">
-                    <a:tint val="75000"/>
-                  </a:schemeClr>
-                </a:solidFill>
-              </a:defRPr>
             </a:lvl3pPr>
             <a:lvl4pPr marL="1371600" indent="0" algn="ctr">
               <a:buNone/>
-              <a:defRPr>
-                <a:solidFill>
-                  <a:schemeClr val="tx1">
-                    <a:tint val="75000"/>
-                  </a:schemeClr>
-                </a:solidFill>
-              </a:defRPr>
             </a:lvl4pPr>
             <a:lvl5pPr marL="1828800" indent="0" algn="ctr">
               <a:buNone/>
-              <a:defRPr>
-                <a:solidFill>
-                  <a:schemeClr val="tx1">
-                    <a:tint val="75000"/>
-                  </a:schemeClr>
-                </a:solidFill>
-              </a:defRPr>
             </a:lvl5pPr>
             <a:lvl6pPr marL="2286000" indent="0" algn="ctr">
               <a:buNone/>
-              <a:defRPr>
-                <a:solidFill>
-                  <a:schemeClr val="tx1">
-                    <a:tint val="75000"/>
-                  </a:schemeClr>
-                </a:solidFill>
-              </a:defRPr>
             </a:lvl6pPr>
             <a:lvl7pPr marL="2743200" indent="0" algn="ctr">
               <a:buNone/>
-              <a:defRPr>
-                <a:solidFill>
-                  <a:schemeClr val="tx1">
-                    <a:tint val="75000"/>
-                  </a:schemeClr>
-                </a:solidFill>
-              </a:defRPr>
             </a:lvl7pPr>
             <a:lvl8pPr marL="3200400" indent="0" algn="ctr">
               <a:buNone/>
-              <a:defRPr>
-                <a:solidFill>
-                  <a:schemeClr val="tx1">
-                    <a:tint val="75000"/>
-                  </a:schemeClr>
-                </a:solidFill>
-              </a:defRPr>
             </a:lvl8pPr>
             <a:lvl9pPr marL="3657600" indent="0" algn="ctr">
               <a:buNone/>
-              <a:defRPr>
+            </a:lvl9pPr>
+            <a:extLst/>
+          </a:lstStyle>
+          <a:p>
+            <a:r>
+              <a:rPr kumimoji="0" lang="en-US" smtClean="0"/>
+              <a:t>Click to edit Master subtitle style</a:t>
+            </a:r>
+            <a:endParaRPr kumimoji="0" lang="en-US"/>
+          </a:p>
+        </p:txBody>
+      </p:sp>
+      <p:sp>
+        <p:nvSpPr>
+          <p:cNvPr id="31" name="Date Placeholder 30"/>
+          <p:cNvSpPr>
+            <a:spLocks noGrp="1"/>
+          </p:cNvSpPr>
+          <p:nvPr>
+            <p:ph type="dt" sz="half" idx="10"/>
+          </p:nvPr>
+        </p:nvSpPr>
+        <p:spPr>
+          <a:xfrm>
+            <a:off x="5871224" y="6557946"/>
+            <a:ext cx="2002464" cy="226902"/>
+          </a:xfrm>
+        </p:spPr>
+        <p:txBody>
+          <a:bodyPr/>
+          <a:lstStyle>
+            <a:lvl1pPr>
+              <a:defRPr lang="en-US" smtClean="0">
                 <a:solidFill>
-                  <a:schemeClr val="tx1">
-                    <a:tint val="75000"/>
-                  </a:schemeClr>
+                  <a:srgbClr val="FFFFFF"/>
                 </a:solidFill>
               </a:defRPr>
-            </a:lvl9pPr>
-          </a:lstStyle>
-          <a:p>
-            <a:r>
-              <a:rPr lang="en-US" smtClean="0"/>
-              <a:t>Click to edit Master subtitle style</a:t>
-            </a:r>
-            <a:endParaRPr lang="en-US"/>
-          </a:p>
-        </p:txBody>
-      </p:sp>
-      <p:sp>
-        <p:nvSpPr>
-          <p:cNvPr id="4" name="Date Placeholder 3"/>
-          <p:cNvSpPr>
-            <a:spLocks noGrp="1"/>
-          </p:cNvSpPr>
-          <p:nvPr>
-            <p:ph type="dt" sz="half" idx="10"/>
-          </p:nvPr>
-        </p:nvSpPr>
-        <p:spPr/>
-        <p:txBody>
-          <a:bodyPr/>
-          <a:lstStyle/>
+            </a:lvl1pPr>
+            <a:extLst/>
+          </a:lstStyle>
           <a:p>
             <a:fld id="{0DE4D319-5C32-4967-9BE3-5F657303EA0B}" type="datetimeFigureOut">
               <a:rPr lang="en-US" smtClean="0"/>
               <a:pPr/>
-              <a:t>5/24/2017</a:t>
+              <a:t>5/25/2017</a:t>
             </a:fld>
             <a:endParaRPr lang="en-US"/>
           </a:p>
@@ -300,7 +389,7 @@
       </p:sp>
       <p:sp>
         <p:nvSpPr>
-          <p:cNvPr id="5" name="Footer Placeholder 4"/>
+          <p:cNvPr id="18" name="Footer Placeholder 17"/>
           <p:cNvSpPr>
             <a:spLocks noGrp="1"/>
           </p:cNvSpPr>
@@ -308,10 +397,24 @@
             <p:ph type="ftr" sz="quarter" idx="11"/>
           </p:nvPr>
         </p:nvSpPr>
-        <p:spPr/>
-        <p:txBody>
-          <a:bodyPr/>
-          <a:lstStyle/>
+        <p:spPr>
+          <a:xfrm>
+            <a:off x="2819400" y="6557946"/>
+            <a:ext cx="2927722" cy="228600"/>
+          </a:xfrm>
+        </p:spPr>
+        <p:txBody>
+          <a:bodyPr/>
+          <a:lstStyle>
+            <a:lvl1pPr>
+              <a:defRPr lang="en-US" dirty="0">
+                <a:solidFill>
+                  <a:srgbClr val="FFFFFF"/>
+                </a:solidFill>
+              </a:defRPr>
+            </a:lvl1pPr>
+            <a:extLst/>
+          </a:lstStyle>
           <a:p>
             <a:endParaRPr lang="en-US"/>
           </a:p>
@@ -319,7 +422,7 @@
       </p:sp>
       <p:sp>
         <p:nvSpPr>
-          <p:cNvPr id="6" name="Slide Number Placeholder 5"/>
+          <p:cNvPr id="29" name="Slide Number Placeholder 28"/>
           <p:cNvSpPr>
             <a:spLocks noGrp="1"/>
           </p:cNvSpPr>
@@ -327,10 +430,24 @@
             <p:ph type="sldNum" sz="quarter" idx="12"/>
           </p:nvPr>
         </p:nvSpPr>
-        <p:spPr/>
-        <p:txBody>
-          <a:bodyPr/>
-          <a:lstStyle/>
+        <p:spPr>
+          <a:xfrm>
+            <a:off x="7880884" y="6556248"/>
+            <a:ext cx="588336" cy="228600"/>
+          </a:xfrm>
+        </p:spPr>
+        <p:txBody>
+          <a:bodyPr/>
+          <a:lstStyle>
+            <a:lvl1pPr>
+              <a:defRPr lang="en-US" smtClean="0">
+                <a:solidFill>
+                  <a:srgbClr val="FFFFFF"/>
+                </a:solidFill>
+              </a:defRPr>
+            </a:lvl1pPr>
+            <a:extLst/>
+          </a:lstStyle>
           <a:p>
             <a:fld id="{005A6A02-12DC-46F6-A044-567379ACCB6A}" type="slidenum">
               <a:rPr lang="en-US" smtClean="0"/>
@@ -344,7 +461,7 @@
     </p:spTree>
   </p:cSld>
   <p:clrMapOvr>
-    <a:masterClrMapping/>
+    <a:overrideClrMapping bg1="lt1" tx1="dk1" bg2="lt2" tx2="dk2" accent1="accent1" accent2="accent2" accent3="accent3" accent4="accent4" accent5="accent5" accent6="accent6" hlink="hlink" folHlink="folHlink"/>
   </p:clrMapOvr>
 </p:sldLayout>
 </file>
@@ -379,13 +496,15 @@
         <p:spPr/>
         <p:txBody>
           <a:bodyPr/>
-          <a:lstStyle/>
-          <a:p>
-            <a:r>
-              <a:rPr lang="en-US" smtClean="0"/>
+          <a:lstStyle>
+            <a:extLst/>
+          </a:lstStyle>
+          <a:p>
+            <a:r>
+              <a:rPr kumimoji="0" lang="en-US" smtClean="0"/>
               <a:t>Click to edit Master title style</a:t>
             </a:r>
-            <a:endParaRPr lang="en-US"/>
+            <a:endParaRPr kumimoji="0" lang="en-US"/>
           </a:p>
         </p:txBody>
       </p:sp>
@@ -402,42 +521,44 @@
         <p:spPr/>
         <p:txBody>
           <a:bodyPr vert="eaVert"/>
-          <a:lstStyle/>
-          <a:p>
-            <a:pPr lvl="0"/>
+          <a:lstStyle>
+            <a:extLst/>
+          </a:lstStyle>
+          <a:p>
+            <a:pPr lvl="0" eaLnBrk="1" latinLnBrk="0" hangingPunct="1"/>
             <a:r>
               <a:rPr lang="en-US" smtClean="0"/>
               <a:t>Click to edit Master text styles</a:t>
             </a:r>
           </a:p>
           <a:p>
-            <a:pPr lvl="1"/>
+            <a:pPr lvl="1" eaLnBrk="1" latinLnBrk="0" hangingPunct="1"/>
             <a:r>
               <a:rPr lang="en-US" smtClean="0"/>
               <a:t>Second level</a:t>
             </a:r>
           </a:p>
           <a:p>
-            <a:pPr lvl="2"/>
+            <a:pPr lvl="2" eaLnBrk="1" latinLnBrk="0" hangingPunct="1"/>
             <a:r>
               <a:rPr lang="en-US" smtClean="0"/>
               <a:t>Third level</a:t>
             </a:r>
           </a:p>
           <a:p>
-            <a:pPr lvl="3"/>
+            <a:pPr lvl="3" eaLnBrk="1" latinLnBrk="0" hangingPunct="1"/>
             <a:r>
               <a:rPr lang="en-US" smtClean="0"/>
               <a:t>Fourth level</a:t>
             </a:r>
           </a:p>
           <a:p>
-            <a:pPr lvl="4"/>
+            <a:pPr lvl="4" eaLnBrk="1" latinLnBrk="0" hangingPunct="1"/>
             <a:r>
               <a:rPr lang="en-US" smtClean="0"/>
               <a:t>Fifth level</a:t>
             </a:r>
-            <a:endParaRPr lang="en-US"/>
+            <a:endParaRPr kumimoji="0" lang="en-US"/>
           </a:p>
         </p:txBody>
       </p:sp>
@@ -454,12 +575,14 @@
         <p:spPr/>
         <p:txBody>
           <a:bodyPr/>
-          <a:lstStyle/>
+          <a:lstStyle>
+            <a:extLst/>
+          </a:lstStyle>
           <a:p>
             <a:fld id="{0DE4D319-5C32-4967-9BE3-5F657303EA0B}" type="datetimeFigureOut">
               <a:rPr lang="en-US" smtClean="0"/>
               <a:pPr/>
-              <a:t>5/24/2017</a:t>
+              <a:t>5/25/2017</a:t>
             </a:fld>
             <a:endParaRPr lang="en-US"/>
           </a:p>
@@ -478,7 +601,9 @@
         <p:spPr/>
         <p:txBody>
           <a:bodyPr/>
-          <a:lstStyle/>
+          <a:lstStyle>
+            <a:extLst/>
+          </a:lstStyle>
           <a:p>
             <a:endParaRPr lang="en-US"/>
           </a:p>
@@ -497,7 +622,9 @@
         <p:spPr/>
         <p:txBody>
           <a:bodyPr/>
-          <a:lstStyle/>
+          <a:lstStyle>
+            <a:extLst/>
+          </a:lstStyle>
           <a:p>
             <a:fld id="{005A6A02-12DC-46F6-A044-567379ACCB6A}" type="slidenum">
               <a:rPr lang="en-US" smtClean="0"/>
@@ -545,98 +672,109 @@
         </p:nvSpPr>
         <p:spPr>
           <a:xfrm>
-            <a:off x="6629400" y="274638"/>
-            <a:ext cx="2057400" cy="5851525"/>
+            <a:off x="6553200" y="274955"/>
+            <a:ext cx="1524000" cy="5851525"/>
+          </a:xfrm>
+        </p:spPr>
+        <p:txBody>
+          <a:bodyPr vert="eaVert" anchor="t"/>
+          <a:lstStyle>
+            <a:extLst/>
+          </a:lstStyle>
+          <a:p>
+            <a:r>
+              <a:rPr kumimoji="0" lang="en-US" smtClean="0"/>
+              <a:t>Click to edit Master title style</a:t>
+            </a:r>
+            <a:endParaRPr kumimoji="0" lang="en-US"/>
+          </a:p>
+        </p:txBody>
+      </p:sp>
+      <p:sp>
+        <p:nvSpPr>
+          <p:cNvPr id="3" name="Vertical Text Placeholder 2"/>
+          <p:cNvSpPr>
+            <a:spLocks noGrp="1"/>
+          </p:cNvSpPr>
+          <p:nvPr>
+            <p:ph type="body" orient="vert" idx="1"/>
+          </p:nvPr>
+        </p:nvSpPr>
+        <p:spPr>
+          <a:xfrm>
+            <a:off x="457200" y="274642"/>
+            <a:ext cx="6019800" cy="5851525"/>
           </a:xfrm>
         </p:spPr>
         <p:txBody>
           <a:bodyPr vert="eaVert"/>
-          <a:lstStyle/>
-          <a:p>
-            <a:r>
-              <a:rPr lang="en-US" smtClean="0"/>
-              <a:t>Click to edit Master title style</a:t>
-            </a:r>
-            <a:endParaRPr lang="en-US"/>
-          </a:p>
-        </p:txBody>
-      </p:sp>
-      <p:sp>
-        <p:nvSpPr>
-          <p:cNvPr id="3" name="Vertical Text Placeholder 2"/>
-          <p:cNvSpPr>
-            <a:spLocks noGrp="1"/>
-          </p:cNvSpPr>
-          <p:nvPr>
-            <p:ph type="body" orient="vert" idx="1"/>
+          <a:lstStyle>
+            <a:extLst/>
+          </a:lstStyle>
+          <a:p>
+            <a:pPr lvl="0" eaLnBrk="1" latinLnBrk="0" hangingPunct="1"/>
+            <a:r>
+              <a:rPr lang="en-US" smtClean="0"/>
+              <a:t>Click to edit Master text styles</a:t>
+            </a:r>
+          </a:p>
+          <a:p>
+            <a:pPr lvl="1" eaLnBrk="1" latinLnBrk="0" hangingPunct="1"/>
+            <a:r>
+              <a:rPr lang="en-US" smtClean="0"/>
+              <a:t>Second level</a:t>
+            </a:r>
+          </a:p>
+          <a:p>
+            <a:pPr lvl="2" eaLnBrk="1" latinLnBrk="0" hangingPunct="1"/>
+            <a:r>
+              <a:rPr lang="en-US" smtClean="0"/>
+              <a:t>Third level</a:t>
+            </a:r>
+          </a:p>
+          <a:p>
+            <a:pPr lvl="3" eaLnBrk="1" latinLnBrk="0" hangingPunct="1"/>
+            <a:r>
+              <a:rPr lang="en-US" smtClean="0"/>
+              <a:t>Fourth level</a:t>
+            </a:r>
+          </a:p>
+          <a:p>
+            <a:pPr lvl="4" eaLnBrk="1" latinLnBrk="0" hangingPunct="1"/>
+            <a:r>
+              <a:rPr lang="en-US" smtClean="0"/>
+              <a:t>Fifth level</a:t>
+            </a:r>
+            <a:endParaRPr kumimoji="0" lang="en-US"/>
+          </a:p>
+        </p:txBody>
+      </p:sp>
+      <p:sp>
+        <p:nvSpPr>
+          <p:cNvPr id="4" name="Date Placeholder 3"/>
+          <p:cNvSpPr>
+            <a:spLocks noGrp="1"/>
+          </p:cNvSpPr>
+          <p:nvPr>
+            <p:ph type="dt" sz="half" idx="10"/>
           </p:nvPr>
         </p:nvSpPr>
         <p:spPr>
           <a:xfrm>
-            <a:off x="457200" y="274638"/>
-            <a:ext cx="6019800" cy="5851525"/>
-          </a:xfrm>
-        </p:spPr>
-        <p:txBody>
-          <a:bodyPr vert="eaVert"/>
-          <a:lstStyle/>
-          <a:p>
-            <a:pPr lvl="0"/>
-            <a:r>
-              <a:rPr lang="en-US" smtClean="0"/>
-              <a:t>Click to edit Master text styles</a:t>
-            </a:r>
-          </a:p>
-          <a:p>
-            <a:pPr lvl="1"/>
-            <a:r>
-              <a:rPr lang="en-US" smtClean="0"/>
-              <a:t>Second level</a:t>
-            </a:r>
-          </a:p>
-          <a:p>
-            <a:pPr lvl="2"/>
-            <a:r>
-              <a:rPr lang="en-US" smtClean="0"/>
-              <a:t>Third level</a:t>
-            </a:r>
-          </a:p>
-          <a:p>
-            <a:pPr lvl="3"/>
-            <a:r>
-              <a:rPr lang="en-US" smtClean="0"/>
-              <a:t>Fourth level</a:t>
-            </a:r>
-          </a:p>
-          <a:p>
-            <a:pPr lvl="4"/>
-            <a:r>
-              <a:rPr lang="en-US" smtClean="0"/>
-              <a:t>Fifth level</a:t>
-            </a:r>
-            <a:endParaRPr lang="en-US"/>
-          </a:p>
-        </p:txBody>
-      </p:sp>
-      <p:sp>
-        <p:nvSpPr>
-          <p:cNvPr id="4" name="Date Placeholder 3"/>
-          <p:cNvSpPr>
-            <a:spLocks noGrp="1"/>
-          </p:cNvSpPr>
-          <p:nvPr>
-            <p:ph type="dt" sz="half" idx="10"/>
-          </p:nvPr>
-        </p:nvSpPr>
-        <p:spPr/>
-        <p:txBody>
-          <a:bodyPr/>
-          <a:lstStyle/>
+            <a:off x="4242816" y="6557946"/>
+            <a:ext cx="2002464" cy="226902"/>
+          </a:xfrm>
+        </p:spPr>
+        <p:txBody>
+          <a:bodyPr/>
+          <a:lstStyle>
+            <a:extLst/>
+          </a:lstStyle>
           <a:p>
             <a:fld id="{0DE4D319-5C32-4967-9BE3-5F657303EA0B}" type="datetimeFigureOut">
               <a:rPr lang="en-US" smtClean="0"/>
               <a:pPr/>
-              <a:t>5/24/2017</a:t>
+              <a:t>5/25/2017</a:t>
             </a:fld>
             <a:endParaRPr lang="en-US"/>
           </a:p>
@@ -652,10 +790,17 @@
             <p:ph type="ftr" sz="quarter" idx="11"/>
           </p:nvPr>
         </p:nvSpPr>
-        <p:spPr/>
-        <p:txBody>
-          <a:bodyPr/>
-          <a:lstStyle/>
+        <p:spPr>
+          <a:xfrm>
+            <a:off x="457200" y="6556248"/>
+            <a:ext cx="3657600" cy="228600"/>
+          </a:xfrm>
+        </p:spPr>
+        <p:txBody>
+          <a:bodyPr/>
+          <a:lstStyle>
+            <a:extLst/>
+          </a:lstStyle>
           <a:p>
             <a:endParaRPr lang="en-US"/>
           </a:p>
@@ -671,10 +816,24 @@
             <p:ph type="sldNum" sz="quarter" idx="12"/>
           </p:nvPr>
         </p:nvSpPr>
-        <p:spPr/>
-        <p:txBody>
-          <a:bodyPr/>
-          <a:lstStyle/>
+        <p:spPr>
+          <a:xfrm>
+            <a:off x="6254496" y="6553200"/>
+            <a:ext cx="588336" cy="228600"/>
+          </a:xfrm>
+        </p:spPr>
+        <p:txBody>
+          <a:bodyPr/>
+          <a:lstStyle>
+            <a:lvl1pPr>
+              <a:defRPr>
+                <a:solidFill>
+                  <a:schemeClr val="tx2"/>
+                </a:solidFill>
+              </a:defRPr>
+            </a:lvl1pPr>
+            <a:extLst/>
+          </a:lstStyle>
           <a:p>
             <a:fld id="{005A6A02-12DC-46F6-A044-567379ACCB6A}" type="slidenum">
               <a:rPr lang="en-US" smtClean="0"/>
@@ -723,13 +882,15 @@
         <p:spPr/>
         <p:txBody>
           <a:bodyPr/>
-          <a:lstStyle/>
-          <a:p>
-            <a:r>
-              <a:rPr lang="en-US" smtClean="0"/>
+          <a:lstStyle>
+            <a:extLst/>
+          </a:lstStyle>
+          <a:p>
+            <a:r>
+              <a:rPr kumimoji="0" lang="en-US" smtClean="0"/>
               <a:t>Click to edit Master title style</a:t>
             </a:r>
-            <a:endParaRPr lang="en-US"/>
+            <a:endParaRPr kumimoji="0" lang="en-US"/>
           </a:p>
         </p:txBody>
       </p:sp>
@@ -746,42 +907,44 @@
         <p:spPr/>
         <p:txBody>
           <a:bodyPr/>
-          <a:lstStyle/>
-          <a:p>
-            <a:pPr lvl="0"/>
+          <a:lstStyle>
+            <a:extLst/>
+          </a:lstStyle>
+          <a:p>
+            <a:pPr lvl="0" eaLnBrk="1" latinLnBrk="0" hangingPunct="1"/>
             <a:r>
               <a:rPr lang="en-US" smtClean="0"/>
               <a:t>Click to edit Master text styles</a:t>
             </a:r>
           </a:p>
           <a:p>
-            <a:pPr lvl="1"/>
+            <a:pPr lvl="1" eaLnBrk="1" latinLnBrk="0" hangingPunct="1"/>
             <a:r>
               <a:rPr lang="en-US" smtClean="0"/>
               <a:t>Second level</a:t>
             </a:r>
           </a:p>
           <a:p>
-            <a:pPr lvl="2"/>
+            <a:pPr lvl="2" eaLnBrk="1" latinLnBrk="0" hangingPunct="1"/>
             <a:r>
               <a:rPr lang="en-US" smtClean="0"/>
               <a:t>Third level</a:t>
             </a:r>
           </a:p>
           <a:p>
-            <a:pPr lvl="3"/>
+            <a:pPr lvl="3" eaLnBrk="1" latinLnBrk="0" hangingPunct="1"/>
             <a:r>
               <a:rPr lang="en-US" smtClean="0"/>
               <a:t>Fourth level</a:t>
             </a:r>
           </a:p>
           <a:p>
-            <a:pPr lvl="4"/>
+            <a:pPr lvl="4" eaLnBrk="1" latinLnBrk="0" hangingPunct="1"/>
             <a:r>
               <a:rPr lang="en-US" smtClean="0"/>
               <a:t>Fifth level</a:t>
             </a:r>
-            <a:endParaRPr lang="en-US"/>
+            <a:endParaRPr kumimoji="0" lang="en-US"/>
           </a:p>
         </p:txBody>
       </p:sp>
@@ -798,12 +961,14 @@
         <p:spPr/>
         <p:txBody>
           <a:bodyPr/>
-          <a:lstStyle/>
+          <a:lstStyle>
+            <a:extLst/>
+          </a:lstStyle>
           <a:p>
             <a:fld id="{0DE4D319-5C32-4967-9BE3-5F657303EA0B}" type="datetimeFigureOut">
               <a:rPr lang="en-US" smtClean="0"/>
               <a:pPr/>
-              <a:t>5/24/2017</a:t>
+              <a:t>5/25/2017</a:t>
             </a:fld>
             <a:endParaRPr lang="en-US"/>
           </a:p>
@@ -822,7 +987,9 @@
         <p:spPr/>
         <p:txBody>
           <a:bodyPr/>
-          <a:lstStyle/>
+          <a:lstStyle>
+            <a:extLst/>
+          </a:lstStyle>
           <a:p>
             <a:endParaRPr lang="en-US"/>
           </a:p>
@@ -841,7 +1008,9 @@
         <p:spPr/>
         <p:txBody>
           <a:bodyPr/>
-          <a:lstStyle/>
+          <a:lstStyle>
+            <a:extLst/>
+          </a:lstStyle>
           <a:p>
             <a:fld id="{005A6A02-12DC-46F6-A044-567379ACCB6A}" type="slidenum">
               <a:rPr lang="en-US" smtClean="0"/>
@@ -863,6 +1032,11 @@
 <file path=ppt/slideLayouts/slideLayout3.xml><?xml version="1.0" encoding="utf-8"?>
 <p:sldLayout xmlns:a="http://schemas.openxmlformats.org/drawingml/2006/main" xmlns:r="http://schemas.openxmlformats.org/officeDocument/2006/relationships" xmlns:p="http://schemas.openxmlformats.org/presentationml/2006/main" type="secHead" preserve="1">
   <p:cSld name="Section Header">
+    <p:bg>
+      <p:bgRef idx="1001">
+        <a:schemeClr val="bg1"/>
+      </p:bgRef>
+    </p:bg>
     <p:spTree>
       <p:nvGrpSpPr>
         <p:cNvPr id="1" name=""/>
@@ -889,23 +1063,25 @@
         </p:nvSpPr>
         <p:spPr>
           <a:xfrm>
-            <a:off x="722313" y="4406900"/>
-            <a:ext cx="7772400" cy="1362075"/>
-          </a:xfrm>
-        </p:spPr>
-        <p:txBody>
-          <a:bodyPr anchor="t"/>
-          <a:lstStyle>
-            <a:lvl1pPr algn="l">
-              <a:defRPr sz="4000" b="1" cap="all"/>
+            <a:off x="1066800" y="2821837"/>
+            <a:ext cx="6255488" cy="1362075"/>
+          </a:xfrm>
+        </p:spPr>
+        <p:txBody>
+          <a:bodyPr tIns="0" anchor="t"/>
+          <a:lstStyle>
+            <a:lvl1pPr algn="r">
+              <a:buNone/>
+              <a:defRPr sz="4200" b="1" cap="all"/>
             </a:lvl1pPr>
-          </a:lstStyle>
-          <a:p>
-            <a:r>
-              <a:rPr lang="en-US" smtClean="0"/>
+            <a:extLst/>
+          </a:lstStyle>
+          <a:p>
+            <a:r>
+              <a:rPr kumimoji="0" lang="en-US" smtClean="0"/>
               <a:t>Click to edit Master title style</a:t>
             </a:r>
-            <a:endParaRPr lang="en-US"/>
+            <a:endParaRPr kumimoji="0" lang="en-US"/>
           </a:p>
         </p:txBody>
       </p:sp>
@@ -921,24 +1097,23 @@
         </p:nvSpPr>
         <p:spPr>
           <a:xfrm>
-            <a:off x="722313" y="2906713"/>
-            <a:ext cx="7772400" cy="1500187"/>
+            <a:off x="1066800" y="1905000"/>
+            <a:ext cx="6255488" cy="743507"/>
           </a:xfrm>
         </p:spPr>
         <p:txBody>
           <a:bodyPr anchor="b"/>
           <a:lstStyle>
-            <a:lvl1pPr marL="0" indent="0">
+            <a:lvl1pPr marL="0" indent="0" algn="r">
               <a:buNone/>
               <a:defRPr sz="2000">
                 <a:solidFill>
-                  <a:schemeClr val="tx1">
-                    <a:tint val="75000"/>
-                  </a:schemeClr>
+                  <a:schemeClr val="tx1"/>
                 </a:solidFill>
+                <a:effectLst/>
               </a:defRPr>
             </a:lvl1pPr>
-            <a:lvl2pPr marL="457200" indent="0">
+            <a:lvl2pPr>
               <a:buNone/>
               <a:defRPr sz="1800">
                 <a:solidFill>
@@ -948,7 +1123,7 @@
                 </a:solidFill>
               </a:defRPr>
             </a:lvl2pPr>
-            <a:lvl3pPr marL="914400" indent="0">
+            <a:lvl3pPr>
               <a:buNone/>
               <a:defRPr sz="1600">
                 <a:solidFill>
@@ -958,7 +1133,7 @@
                 </a:solidFill>
               </a:defRPr>
             </a:lvl3pPr>
-            <a:lvl4pPr marL="1371600" indent="0">
+            <a:lvl4pPr>
               <a:buNone/>
               <a:defRPr sz="1400">
                 <a:solidFill>
@@ -968,7 +1143,7 @@
                 </a:solidFill>
               </a:defRPr>
             </a:lvl4pPr>
-            <a:lvl5pPr marL="1828800" indent="0">
+            <a:lvl5pPr>
               <a:buNone/>
               <a:defRPr sz="1400">
                 <a:solidFill>
@@ -978,101 +1153,90 @@
                 </a:solidFill>
               </a:defRPr>
             </a:lvl5pPr>
-            <a:lvl6pPr marL="2286000" indent="0">
-              <a:buNone/>
-              <a:defRPr sz="1400">
+            <a:extLst/>
+          </a:lstStyle>
+          <a:p>
+            <a:pPr lvl="0" eaLnBrk="1" latinLnBrk="0" hangingPunct="1"/>
+            <a:r>
+              <a:rPr kumimoji="0" lang="en-US" smtClean="0"/>
+              <a:t>Click to edit Master text styles</a:t>
+            </a:r>
+          </a:p>
+        </p:txBody>
+      </p:sp>
+      <p:sp>
+        <p:nvSpPr>
+          <p:cNvPr id="4" name="Date Placeholder 3"/>
+          <p:cNvSpPr>
+            <a:spLocks noGrp="1"/>
+          </p:cNvSpPr>
+          <p:nvPr>
+            <p:ph type="dt" sz="half" idx="10"/>
+          </p:nvPr>
+        </p:nvSpPr>
+        <p:spPr>
+          <a:xfrm>
+            <a:off x="4724238" y="6556810"/>
+            <a:ext cx="2002464" cy="226902"/>
+          </a:xfrm>
+        </p:spPr>
+        <p:txBody>
+          <a:bodyPr bIns="0" anchor="b"/>
+          <a:lstStyle>
+            <a:lvl1pPr>
+              <a:defRPr>
                 <a:solidFill>
-                  <a:schemeClr val="tx1">
-                    <a:tint val="75000"/>
-                  </a:schemeClr>
+                  <a:schemeClr val="tx2"/>
                 </a:solidFill>
               </a:defRPr>
-            </a:lvl6pPr>
-            <a:lvl7pPr marL="2743200" indent="0">
-              <a:buNone/>
-              <a:defRPr sz="1400">
+            </a:lvl1pPr>
+            <a:extLst/>
+          </a:lstStyle>
+          <a:p>
+            <a:fld id="{0DE4D319-5C32-4967-9BE3-5F657303EA0B}" type="datetimeFigureOut">
+              <a:rPr lang="en-US" smtClean="0"/>
+              <a:pPr/>
+              <a:t>5/25/2017</a:t>
+            </a:fld>
+            <a:endParaRPr lang="en-US"/>
+          </a:p>
+        </p:txBody>
+      </p:sp>
+      <p:sp>
+        <p:nvSpPr>
+          <p:cNvPr id="5" name="Footer Placeholder 4"/>
+          <p:cNvSpPr>
+            <a:spLocks noGrp="1"/>
+          </p:cNvSpPr>
+          <p:nvPr>
+            <p:ph type="ftr" sz="quarter" idx="11"/>
+          </p:nvPr>
+        </p:nvSpPr>
+        <p:spPr>
+          <a:xfrm>
+            <a:off x="1735358" y="6556810"/>
+            <a:ext cx="2895600" cy="228600"/>
+          </a:xfrm>
+        </p:spPr>
+        <p:txBody>
+          <a:bodyPr bIns="0" anchor="b"/>
+          <a:lstStyle>
+            <a:lvl1pPr>
+              <a:defRPr>
                 <a:solidFill>
-                  <a:schemeClr val="tx1">
-                    <a:tint val="75000"/>
-                  </a:schemeClr>
+                  <a:schemeClr val="tx2"/>
                 </a:solidFill>
               </a:defRPr>
-            </a:lvl7pPr>
-            <a:lvl8pPr marL="3200400" indent="0">
-              <a:buNone/>
-              <a:defRPr sz="1400">
-                <a:solidFill>
-                  <a:schemeClr val="tx1">
-                    <a:tint val="75000"/>
-                  </a:schemeClr>
-                </a:solidFill>
-              </a:defRPr>
-            </a:lvl8pPr>
-            <a:lvl9pPr marL="3657600" indent="0">
-              <a:buNone/>
-              <a:defRPr sz="1400">
-                <a:solidFill>
-                  <a:schemeClr val="tx1">
-                    <a:tint val="75000"/>
-                  </a:schemeClr>
-                </a:solidFill>
-              </a:defRPr>
-            </a:lvl9pPr>
-          </a:lstStyle>
-          <a:p>
-            <a:pPr lvl="0"/>
-            <a:r>
-              <a:rPr lang="en-US" smtClean="0"/>
-              <a:t>Click to edit Master text styles</a:t>
-            </a:r>
-          </a:p>
-        </p:txBody>
-      </p:sp>
-      <p:sp>
-        <p:nvSpPr>
-          <p:cNvPr id="4" name="Date Placeholder 3"/>
-          <p:cNvSpPr>
-            <a:spLocks noGrp="1"/>
-          </p:cNvSpPr>
-          <p:nvPr>
-            <p:ph type="dt" sz="half" idx="10"/>
-          </p:nvPr>
-        </p:nvSpPr>
-        <p:spPr/>
-        <p:txBody>
-          <a:bodyPr/>
-          <a:lstStyle/>
-          <a:p>
-            <a:fld id="{0DE4D319-5C32-4967-9BE3-5F657303EA0B}" type="datetimeFigureOut">
-              <a:rPr lang="en-US" smtClean="0"/>
-              <a:pPr/>
-              <a:t>5/24/2017</a:t>
-            </a:fld>
+            </a:lvl1pPr>
+            <a:extLst/>
+          </a:lstStyle>
+          <a:p>
             <a:endParaRPr lang="en-US"/>
           </a:p>
         </p:txBody>
       </p:sp>
       <p:sp>
         <p:nvSpPr>
-          <p:cNvPr id="5" name="Footer Placeholder 4"/>
-          <p:cNvSpPr>
-            <a:spLocks noGrp="1"/>
-          </p:cNvSpPr>
-          <p:nvPr>
-            <p:ph type="ftr" sz="quarter" idx="11"/>
-          </p:nvPr>
-        </p:nvSpPr>
-        <p:spPr/>
-        <p:txBody>
-          <a:bodyPr/>
-          <a:lstStyle/>
-          <a:p>
-            <a:endParaRPr lang="en-US"/>
-          </a:p>
-        </p:txBody>
-      </p:sp>
-      <p:sp>
-        <p:nvSpPr>
           <p:cNvPr id="6" name="Slide Number Placeholder 5"/>
           <p:cNvSpPr>
             <a:spLocks noGrp="1"/>
@@ -1081,10 +1245,17 @@
             <p:ph type="sldNum" sz="quarter" idx="12"/>
           </p:nvPr>
         </p:nvSpPr>
-        <p:spPr/>
-        <p:txBody>
-          <a:bodyPr/>
-          <a:lstStyle/>
+        <p:spPr>
+          <a:xfrm>
+            <a:off x="6733952" y="6555112"/>
+            <a:ext cx="588336" cy="228600"/>
+          </a:xfrm>
+        </p:spPr>
+        <p:txBody>
+          <a:bodyPr/>
+          <a:lstStyle>
+            <a:extLst/>
+          </a:lstStyle>
           <a:p>
             <a:fld id="{005A6A02-12DC-46F6-A044-567379ACCB6A}" type="slidenum">
               <a:rPr lang="en-US" smtClean="0"/>
@@ -1098,7 +1269,7 @@
     </p:spTree>
   </p:cSld>
   <p:clrMapOvr>
-    <a:masterClrMapping/>
+    <a:overrideClrMapping bg1="lt1" tx1="dk1" bg2="lt2" tx2="dk2" accent1="accent1" accent2="accent2" accent3="accent3" accent4="accent4" accent5="accent5" accent6="accent6" hlink="hlink" folHlink="folHlink"/>
   </p:clrMapOvr>
 </p:sldLayout>
 </file>
@@ -1130,16 +1301,23 @@
             <p:ph type="title"/>
           </p:nvPr>
         </p:nvSpPr>
-        <p:spPr/>
-        <p:txBody>
-          <a:bodyPr/>
-          <a:lstStyle/>
-          <a:p>
-            <a:r>
-              <a:rPr lang="en-US" smtClean="0"/>
+        <p:spPr>
+          <a:xfrm>
+            <a:off x="457200" y="320040"/>
+            <a:ext cx="7242048" cy="1143000"/>
+          </a:xfrm>
+        </p:spPr>
+        <p:txBody>
+          <a:bodyPr/>
+          <a:lstStyle>
+            <a:extLst/>
+          </a:lstStyle>
+          <a:p>
+            <a:r>
+              <a:rPr kumimoji="0" lang="en-US" smtClean="0"/>
               <a:t>Click to edit Master title style</a:t>
             </a:r>
-            <a:endParaRPr lang="en-US"/>
+            <a:endParaRPr kumimoji="0" lang="en-US"/>
           </a:p>
         </p:txBody>
       </p:sp>
@@ -1156,11 +1334,11 @@
         <p:spPr>
           <a:xfrm>
             <a:off x="457200" y="1600200"/>
-            <a:ext cx="4038600" cy="4525963"/>
-          </a:xfrm>
-        </p:spPr>
-        <p:txBody>
-          <a:bodyPr/>
+            <a:ext cx="3520440" cy="4525963"/>
+          </a:xfrm>
+        </p:spPr>
+        <p:txBody>
+          <a:bodyPr anchor="t"/>
           <a:lstStyle>
             <a:lvl1pPr>
               <a:defRPr sz="2800"/>
@@ -1177,54 +1355,43 @@
             <a:lvl5pPr>
               <a:defRPr sz="1800"/>
             </a:lvl5pPr>
-            <a:lvl6pPr>
-              <a:defRPr sz="1800"/>
-            </a:lvl6pPr>
-            <a:lvl7pPr>
-              <a:defRPr sz="1800"/>
-            </a:lvl7pPr>
-            <a:lvl8pPr>
-              <a:defRPr sz="1800"/>
-            </a:lvl8pPr>
-            <a:lvl9pPr>
-              <a:defRPr sz="1800"/>
-            </a:lvl9pPr>
-          </a:lstStyle>
-          <a:p>
-            <a:pPr lvl="0"/>
+            <a:extLst/>
+          </a:lstStyle>
+          <a:p>
+            <a:pPr lvl="0" eaLnBrk="1" latinLnBrk="0" hangingPunct="1"/>
             <a:r>
               <a:rPr lang="en-US" smtClean="0"/>
               <a:t>Click to edit Master text styles</a:t>
             </a:r>
           </a:p>
           <a:p>
-            <a:pPr lvl="1"/>
+            <a:pPr lvl="1" eaLnBrk="1" latinLnBrk="0" hangingPunct="1"/>
             <a:r>
               <a:rPr lang="en-US" smtClean="0"/>
               <a:t>Second level</a:t>
             </a:r>
           </a:p>
           <a:p>
-            <a:pPr lvl="2"/>
+            <a:pPr lvl="2" eaLnBrk="1" latinLnBrk="0" hangingPunct="1"/>
             <a:r>
               <a:rPr lang="en-US" smtClean="0"/>
               <a:t>Third level</a:t>
             </a:r>
           </a:p>
           <a:p>
-            <a:pPr lvl="3"/>
+            <a:pPr lvl="3" eaLnBrk="1" latinLnBrk="0" hangingPunct="1"/>
             <a:r>
               <a:rPr lang="en-US" smtClean="0"/>
               <a:t>Fourth level</a:t>
             </a:r>
           </a:p>
           <a:p>
-            <a:pPr lvl="4"/>
+            <a:pPr lvl="4" eaLnBrk="1" latinLnBrk="0" hangingPunct="1"/>
             <a:r>
               <a:rPr lang="en-US" smtClean="0"/>
               <a:t>Fifth level</a:t>
             </a:r>
-            <a:endParaRPr lang="en-US"/>
+            <a:endParaRPr kumimoji="0" lang="en-US"/>
           </a:p>
         </p:txBody>
       </p:sp>
@@ -1240,12 +1407,12 @@
         </p:nvSpPr>
         <p:spPr>
           <a:xfrm>
-            <a:off x="4648200" y="1600200"/>
-            <a:ext cx="4038600" cy="4525963"/>
-          </a:xfrm>
-        </p:spPr>
-        <p:txBody>
-          <a:bodyPr/>
+            <a:off x="4178808" y="1600200"/>
+            <a:ext cx="3520440" cy="4525963"/>
+          </a:xfrm>
+        </p:spPr>
+        <p:txBody>
+          <a:bodyPr anchor="t"/>
           <a:lstStyle>
             <a:lvl1pPr>
               <a:defRPr sz="2800"/>
@@ -1262,54 +1429,43 @@
             <a:lvl5pPr>
               <a:defRPr sz="1800"/>
             </a:lvl5pPr>
-            <a:lvl6pPr>
-              <a:defRPr sz="1800"/>
-            </a:lvl6pPr>
-            <a:lvl7pPr>
-              <a:defRPr sz="1800"/>
-            </a:lvl7pPr>
-            <a:lvl8pPr>
-              <a:defRPr sz="1800"/>
-            </a:lvl8pPr>
-            <a:lvl9pPr>
-              <a:defRPr sz="1800"/>
-            </a:lvl9pPr>
-          </a:lstStyle>
-          <a:p>
-            <a:pPr lvl="0"/>
+            <a:extLst/>
+          </a:lstStyle>
+          <a:p>
+            <a:pPr lvl="0" eaLnBrk="1" latinLnBrk="0" hangingPunct="1"/>
             <a:r>
               <a:rPr lang="en-US" smtClean="0"/>
               <a:t>Click to edit Master text styles</a:t>
             </a:r>
           </a:p>
           <a:p>
-            <a:pPr lvl="1"/>
+            <a:pPr lvl="1" eaLnBrk="1" latinLnBrk="0" hangingPunct="1"/>
             <a:r>
               <a:rPr lang="en-US" smtClean="0"/>
               <a:t>Second level</a:t>
             </a:r>
           </a:p>
           <a:p>
-            <a:pPr lvl="2"/>
+            <a:pPr lvl="2" eaLnBrk="1" latinLnBrk="0" hangingPunct="1"/>
             <a:r>
               <a:rPr lang="en-US" smtClean="0"/>
               <a:t>Third level</a:t>
             </a:r>
           </a:p>
           <a:p>
-            <a:pPr lvl="3"/>
+            <a:pPr lvl="3" eaLnBrk="1" latinLnBrk="0" hangingPunct="1"/>
             <a:r>
               <a:rPr lang="en-US" smtClean="0"/>
               <a:t>Fourth level</a:t>
             </a:r>
           </a:p>
           <a:p>
-            <a:pPr lvl="4"/>
+            <a:pPr lvl="4" eaLnBrk="1" latinLnBrk="0" hangingPunct="1"/>
             <a:r>
               <a:rPr lang="en-US" smtClean="0"/>
               <a:t>Fifth level</a:t>
             </a:r>
-            <a:endParaRPr lang="en-US"/>
+            <a:endParaRPr kumimoji="0" lang="en-US"/>
           </a:p>
         </p:txBody>
       </p:sp>
@@ -1326,12 +1482,14 @@
         <p:spPr/>
         <p:txBody>
           <a:bodyPr/>
-          <a:lstStyle/>
+          <a:lstStyle>
+            <a:extLst/>
+          </a:lstStyle>
           <a:p>
             <a:fld id="{0DE4D319-5C32-4967-9BE3-5F657303EA0B}" type="datetimeFigureOut">
               <a:rPr lang="en-US" smtClean="0"/>
               <a:pPr/>
-              <a:t>5/24/2017</a:t>
+              <a:t>5/25/2017</a:t>
             </a:fld>
             <a:endParaRPr lang="en-US"/>
           </a:p>
@@ -1350,7 +1508,9 @@
         <p:spPr/>
         <p:txBody>
           <a:bodyPr/>
-          <a:lstStyle/>
+          <a:lstStyle>
+            <a:extLst/>
+          </a:lstStyle>
           <a:p>
             <a:endParaRPr lang="en-US"/>
           </a:p>
@@ -1369,7 +1529,9 @@
         <p:spPr/>
         <p:txBody>
           <a:bodyPr/>
-          <a:lstStyle/>
+          <a:lstStyle>
+            <a:extLst/>
+          </a:lstStyle>
           <a:p>
             <a:fld id="{005A6A02-12DC-46F6-A044-567379ACCB6A}" type="slidenum">
               <a:rPr lang="en-US" smtClean="0"/>
@@ -1415,20 +1577,26 @@
             <p:ph type="title"/>
           </p:nvPr>
         </p:nvSpPr>
-        <p:spPr/>
-        <p:txBody>
-          <a:bodyPr/>
+        <p:spPr>
+          <a:xfrm>
+            <a:off x="457200" y="320040"/>
+            <a:ext cx="7242048" cy="1143000"/>
+          </a:xfrm>
+        </p:spPr>
+        <p:txBody>
+          <a:bodyPr anchor="b"/>
           <a:lstStyle>
             <a:lvl1pPr>
               <a:defRPr/>
             </a:lvl1pPr>
-          </a:lstStyle>
-          <a:p>
-            <a:r>
-              <a:rPr lang="en-US" smtClean="0"/>
+            <a:extLst/>
+          </a:lstStyle>
+          <a:p>
+            <a:r>
+              <a:rPr kumimoji="0" lang="en-US" smtClean="0"/>
               <a:t>Click to edit Master title style</a:t>
             </a:r>
-            <a:endParaRPr lang="en-US"/>
+            <a:endParaRPr kumimoji="0" lang="en-US"/>
           </a:p>
         </p:txBody>
       </p:sp>
@@ -1444,54 +1612,143 @@
         </p:nvSpPr>
         <p:spPr>
           <a:xfrm>
-            <a:off x="457200" y="1535113"/>
-            <a:ext cx="4040188" cy="639762"/>
-          </a:xfrm>
-        </p:spPr>
-        <p:txBody>
-          <a:bodyPr anchor="b"/>
-          <a:lstStyle>
-            <a:lvl1pPr marL="0" indent="0">
+            <a:off x="457200" y="5867400"/>
+            <a:ext cx="3520440" cy="457200"/>
+          </a:xfrm>
+          <a:noFill/>
+          <a:ln w="12700" cap="flat" cmpd="sng" algn="ctr">
+            <a:solidFill>
+              <a:schemeClr val="tx2"/>
+            </a:solidFill>
+            <a:prstDash val="solid"/>
+          </a:ln>
+          <a:effectLst/>
+        </p:spPr>
+        <p:style>
+          <a:lnRef idx="1">
+            <a:schemeClr val="accent1"/>
+          </a:lnRef>
+          <a:fillRef idx="3">
+            <a:schemeClr val="accent1"/>
+          </a:fillRef>
+          <a:effectRef idx="2">
+            <a:schemeClr val="accent1"/>
+          </a:effectRef>
+          <a:fontRef idx="minor">
+            <a:schemeClr val="lt1"/>
+          </a:fontRef>
+        </p:style>
+        <p:txBody>
+          <a:bodyPr anchor="ctr"/>
+          <a:lstStyle>
+            <a:lvl1pPr marL="0" indent="0" algn="ctr">
               <a:buNone/>
-              <a:defRPr sz="2400" b="1"/>
+              <a:defRPr sz="1800" b="1">
+                <a:solidFill>
+                  <a:schemeClr val="tx2"/>
+                </a:solidFill>
+                <a:effectLst/>
+              </a:defRPr>
             </a:lvl1pPr>
-            <a:lvl2pPr marL="457200" indent="0">
+            <a:lvl2pPr>
               <a:buNone/>
               <a:defRPr sz="2000" b="1"/>
             </a:lvl2pPr>
-            <a:lvl3pPr marL="914400" indent="0">
+            <a:lvl3pPr>
               <a:buNone/>
               <a:defRPr sz="1800" b="1"/>
             </a:lvl3pPr>
-            <a:lvl4pPr marL="1371600" indent="0">
+            <a:lvl4pPr>
               <a:buNone/>
               <a:defRPr sz="1600" b="1"/>
             </a:lvl4pPr>
-            <a:lvl5pPr marL="1828800" indent="0">
+            <a:lvl5pPr>
               <a:buNone/>
               <a:defRPr sz="1600" b="1"/>
             </a:lvl5pPr>
-            <a:lvl6pPr marL="2286000" indent="0">
+            <a:extLst/>
+          </a:lstStyle>
+          <a:p>
+            <a:pPr lvl="0" eaLnBrk="1" latinLnBrk="0" hangingPunct="1"/>
+            <a:r>
+              <a:rPr kumimoji="0" lang="en-US" smtClean="0"/>
+              <a:t>Click to edit Master text styles</a:t>
+            </a:r>
+          </a:p>
+        </p:txBody>
+      </p:sp>
+      <p:sp>
+        <p:nvSpPr>
+          <p:cNvPr id="4" name="Text Placeholder 3"/>
+          <p:cNvSpPr>
+            <a:spLocks noGrp="1"/>
+          </p:cNvSpPr>
+          <p:nvPr>
+            <p:ph type="body" sz="half" idx="3"/>
+          </p:nvPr>
+        </p:nvSpPr>
+        <p:spPr>
+          <a:xfrm>
+            <a:off x="4178808" y="5867400"/>
+            <a:ext cx="3520440" cy="457200"/>
+          </a:xfrm>
+          <a:noFill/>
+          <a:ln w="12700" cap="flat" cmpd="sng" algn="ctr">
+            <a:solidFill>
+              <a:schemeClr val="tx2"/>
+            </a:solidFill>
+            <a:prstDash val="solid"/>
+          </a:ln>
+          <a:effectLst/>
+        </p:spPr>
+        <p:style>
+          <a:lnRef idx="1">
+            <a:schemeClr val="accent2"/>
+          </a:lnRef>
+          <a:fillRef idx="3">
+            <a:schemeClr val="accent2"/>
+          </a:fillRef>
+          <a:effectRef idx="2">
+            <a:schemeClr val="accent2"/>
+          </a:effectRef>
+          <a:fontRef idx="minor">
+            <a:schemeClr val="lt1"/>
+          </a:fontRef>
+        </p:style>
+        <p:txBody>
+          <a:bodyPr anchor="ctr"/>
+          <a:lstStyle>
+            <a:lvl1pPr marL="0" indent="0" algn="ctr">
+              <a:buNone/>
+              <a:defRPr sz="1800" b="1">
+                <a:solidFill>
+                  <a:schemeClr val="tx2"/>
+                </a:solidFill>
+                <a:effectLst/>
+              </a:defRPr>
+            </a:lvl1pPr>
+            <a:lvl2pPr>
+              <a:buNone/>
+              <a:defRPr sz="2000" b="1"/>
+            </a:lvl2pPr>
+            <a:lvl3pPr>
+              <a:buNone/>
+              <a:defRPr sz="1800" b="1"/>
+            </a:lvl3pPr>
+            <a:lvl4pPr>
               <a:buNone/>
               <a:defRPr sz="1600" b="1"/>
-            </a:lvl6pPr>
-            <a:lvl7pPr marL="2743200" indent="0">
+            </a:lvl4pPr>
+            <a:lvl5pPr>
               <a:buNone/>
               <a:defRPr sz="1600" b="1"/>
-            </a:lvl7pPr>
-            <a:lvl8pPr marL="3200400" indent="0">
-              <a:buNone/>
-              <a:defRPr sz="1600" b="1"/>
-            </a:lvl8pPr>
-            <a:lvl9pPr marL="3657600" indent="0">
-              <a:buNone/>
-              <a:defRPr sz="1600" b="1"/>
-            </a:lvl9pPr>
-          </a:lstStyle>
-          <a:p>
-            <a:pPr lvl="0"/>
-            <a:r>
-              <a:rPr lang="en-US" smtClean="0"/>
+            </a:lvl5pPr>
+            <a:extLst/>
+          </a:lstStyle>
+          <a:p>
+            <a:pPr lvl="0" eaLnBrk="1" latinLnBrk="0" hangingPunct="1"/>
+            <a:r>
+              <a:rPr kumimoji="0" lang="en-US" smtClean="0"/>
               <a:t>Click to edit Master text styles</a:t>
             </a:r>
           </a:p>
@@ -1499,18 +1756,18 @@
       </p:sp>
       <p:sp>
         <p:nvSpPr>
-          <p:cNvPr id="4" name="Content Placeholder 3"/>
-          <p:cNvSpPr>
-            <a:spLocks noGrp="1"/>
-          </p:cNvSpPr>
-          <p:nvPr>
-            <p:ph sz="half" idx="2"/>
+          <p:cNvPr id="5" name="Content Placeholder 4"/>
+          <p:cNvSpPr>
+            <a:spLocks noGrp="1"/>
+          </p:cNvSpPr>
+          <p:nvPr>
+            <p:ph sz="quarter" idx="2"/>
           </p:nvPr>
         </p:nvSpPr>
         <p:spPr>
           <a:xfrm>
-            <a:off x="457200" y="2174875"/>
-            <a:ext cx="4040188" cy="3951288"/>
+            <a:off x="457200" y="1711840"/>
+            <a:ext cx="3520440" cy="4114800"/>
           </a:xfrm>
         </p:spPr>
         <p:txBody>
@@ -1531,136 +1788,60 @@
             <a:lvl5pPr>
               <a:defRPr sz="1600"/>
             </a:lvl5pPr>
-            <a:lvl6pPr>
-              <a:defRPr sz="1600"/>
-            </a:lvl6pPr>
-            <a:lvl7pPr>
-              <a:defRPr sz="1600"/>
-            </a:lvl7pPr>
-            <a:lvl8pPr>
-              <a:defRPr sz="1600"/>
-            </a:lvl8pPr>
-            <a:lvl9pPr>
-              <a:defRPr sz="1600"/>
-            </a:lvl9pPr>
-          </a:lstStyle>
-          <a:p>
-            <a:pPr lvl="0"/>
+            <a:extLst/>
+          </a:lstStyle>
+          <a:p>
+            <a:pPr lvl="0" eaLnBrk="1" latinLnBrk="0" hangingPunct="1"/>
             <a:r>
               <a:rPr lang="en-US" smtClean="0"/>
               <a:t>Click to edit Master text styles</a:t>
             </a:r>
           </a:p>
           <a:p>
-            <a:pPr lvl="1"/>
+            <a:pPr lvl="1" eaLnBrk="1" latinLnBrk="0" hangingPunct="1"/>
             <a:r>
               <a:rPr lang="en-US" smtClean="0"/>
               <a:t>Second level</a:t>
             </a:r>
           </a:p>
           <a:p>
-            <a:pPr lvl="2"/>
+            <a:pPr lvl="2" eaLnBrk="1" latinLnBrk="0" hangingPunct="1"/>
             <a:r>
               <a:rPr lang="en-US" smtClean="0"/>
               <a:t>Third level</a:t>
             </a:r>
           </a:p>
           <a:p>
-            <a:pPr lvl="3"/>
+            <a:pPr lvl="3" eaLnBrk="1" latinLnBrk="0" hangingPunct="1"/>
             <a:r>
               <a:rPr lang="en-US" smtClean="0"/>
               <a:t>Fourth level</a:t>
             </a:r>
           </a:p>
           <a:p>
-            <a:pPr lvl="4"/>
+            <a:pPr lvl="4" eaLnBrk="1" latinLnBrk="0" hangingPunct="1"/>
             <a:r>
               <a:rPr lang="en-US" smtClean="0"/>
               <a:t>Fifth level</a:t>
             </a:r>
-            <a:endParaRPr lang="en-US"/>
-          </a:p>
-        </p:txBody>
-      </p:sp>
-      <p:sp>
-        <p:nvSpPr>
-          <p:cNvPr id="5" name="Text Placeholder 4"/>
-          <p:cNvSpPr>
-            <a:spLocks noGrp="1"/>
-          </p:cNvSpPr>
-          <p:nvPr>
-            <p:ph type="body" sz="quarter" idx="3"/>
+            <a:endParaRPr kumimoji="0" lang="en-US"/>
+          </a:p>
+        </p:txBody>
+      </p:sp>
+      <p:sp>
+        <p:nvSpPr>
+          <p:cNvPr id="6" name="Content Placeholder 5"/>
+          <p:cNvSpPr>
+            <a:spLocks noGrp="1"/>
+          </p:cNvSpPr>
+          <p:nvPr>
+            <p:ph sz="quarter" idx="4"/>
           </p:nvPr>
         </p:nvSpPr>
         <p:spPr>
           <a:xfrm>
-            <a:off x="4645025" y="1535113"/>
-            <a:ext cx="4041775" cy="639762"/>
-          </a:xfrm>
-        </p:spPr>
-        <p:txBody>
-          <a:bodyPr anchor="b"/>
-          <a:lstStyle>
-            <a:lvl1pPr marL="0" indent="0">
-              <a:buNone/>
-              <a:defRPr sz="2400" b="1"/>
-            </a:lvl1pPr>
-            <a:lvl2pPr marL="457200" indent="0">
-              <a:buNone/>
-              <a:defRPr sz="2000" b="1"/>
-            </a:lvl2pPr>
-            <a:lvl3pPr marL="914400" indent="0">
-              <a:buNone/>
-              <a:defRPr sz="1800" b="1"/>
-            </a:lvl3pPr>
-            <a:lvl4pPr marL="1371600" indent="0">
-              <a:buNone/>
-              <a:defRPr sz="1600" b="1"/>
-            </a:lvl4pPr>
-            <a:lvl5pPr marL="1828800" indent="0">
-              <a:buNone/>
-              <a:defRPr sz="1600" b="1"/>
-            </a:lvl5pPr>
-            <a:lvl6pPr marL="2286000" indent="0">
-              <a:buNone/>
-              <a:defRPr sz="1600" b="1"/>
-            </a:lvl6pPr>
-            <a:lvl7pPr marL="2743200" indent="0">
-              <a:buNone/>
-              <a:defRPr sz="1600" b="1"/>
-            </a:lvl7pPr>
-            <a:lvl8pPr marL="3200400" indent="0">
-              <a:buNone/>
-              <a:defRPr sz="1600" b="1"/>
-            </a:lvl8pPr>
-            <a:lvl9pPr marL="3657600" indent="0">
-              <a:buNone/>
-              <a:defRPr sz="1600" b="1"/>
-            </a:lvl9pPr>
-          </a:lstStyle>
-          <a:p>
-            <a:pPr lvl="0"/>
-            <a:r>
-              <a:rPr lang="en-US" smtClean="0"/>
-              <a:t>Click to edit Master text styles</a:t>
-            </a:r>
-          </a:p>
-        </p:txBody>
-      </p:sp>
-      <p:sp>
-        <p:nvSpPr>
-          <p:cNvPr id="6" name="Content Placeholder 5"/>
-          <p:cNvSpPr>
-            <a:spLocks noGrp="1"/>
-          </p:cNvSpPr>
-          <p:nvPr>
-            <p:ph sz="quarter" idx="4"/>
-          </p:nvPr>
-        </p:nvSpPr>
-        <p:spPr>
-          <a:xfrm>
-            <a:off x="4645025" y="2174875"/>
-            <a:ext cx="4041775" cy="3951288"/>
+            <a:off x="4178808" y="1711840"/>
+            <a:ext cx="3520440" cy="4114800"/>
           </a:xfrm>
         </p:spPr>
         <p:txBody>
@@ -1681,54 +1862,43 @@
             <a:lvl5pPr>
               <a:defRPr sz="1600"/>
             </a:lvl5pPr>
-            <a:lvl6pPr>
-              <a:defRPr sz="1600"/>
-            </a:lvl6pPr>
-            <a:lvl7pPr>
-              <a:defRPr sz="1600"/>
-            </a:lvl7pPr>
-            <a:lvl8pPr>
-              <a:defRPr sz="1600"/>
-            </a:lvl8pPr>
-            <a:lvl9pPr>
-              <a:defRPr sz="1600"/>
-            </a:lvl9pPr>
-          </a:lstStyle>
-          <a:p>
-            <a:pPr lvl="0"/>
+            <a:extLst/>
+          </a:lstStyle>
+          <a:p>
+            <a:pPr lvl="0" eaLnBrk="1" latinLnBrk="0" hangingPunct="1"/>
             <a:r>
               <a:rPr lang="en-US" smtClean="0"/>
               <a:t>Click to edit Master text styles</a:t>
             </a:r>
           </a:p>
           <a:p>
-            <a:pPr lvl="1"/>
+            <a:pPr lvl="1" eaLnBrk="1" latinLnBrk="0" hangingPunct="1"/>
             <a:r>
               <a:rPr lang="en-US" smtClean="0"/>
               <a:t>Second level</a:t>
             </a:r>
           </a:p>
           <a:p>
-            <a:pPr lvl="2"/>
+            <a:pPr lvl="2" eaLnBrk="1" latinLnBrk="0" hangingPunct="1"/>
             <a:r>
               <a:rPr lang="en-US" smtClean="0"/>
               <a:t>Third level</a:t>
             </a:r>
           </a:p>
           <a:p>
-            <a:pPr lvl="3"/>
+            <a:pPr lvl="3" eaLnBrk="1" latinLnBrk="0" hangingPunct="1"/>
             <a:r>
               <a:rPr lang="en-US" smtClean="0"/>
               <a:t>Fourth level</a:t>
             </a:r>
           </a:p>
           <a:p>
-            <a:pPr lvl="4"/>
+            <a:pPr lvl="4" eaLnBrk="1" latinLnBrk="0" hangingPunct="1"/>
             <a:r>
               <a:rPr lang="en-US" smtClean="0"/>
               <a:t>Fifth level</a:t>
             </a:r>
-            <a:endParaRPr lang="en-US"/>
+            <a:endParaRPr kumimoji="0" lang="en-US"/>
           </a:p>
         </p:txBody>
       </p:sp>
@@ -1745,12 +1915,14 @@
         <p:spPr/>
         <p:txBody>
           <a:bodyPr/>
-          <a:lstStyle/>
+          <a:lstStyle>
+            <a:extLst/>
+          </a:lstStyle>
           <a:p>
             <a:fld id="{0DE4D319-5C32-4967-9BE3-5F657303EA0B}" type="datetimeFigureOut">
               <a:rPr lang="en-US" smtClean="0"/>
               <a:pPr/>
-              <a:t>5/24/2017</a:t>
+              <a:t>5/25/2017</a:t>
             </a:fld>
             <a:endParaRPr lang="en-US"/>
           </a:p>
@@ -1769,7 +1941,9 @@
         <p:spPr/>
         <p:txBody>
           <a:bodyPr/>
-          <a:lstStyle/>
+          <a:lstStyle>
+            <a:extLst/>
+          </a:lstStyle>
           <a:p>
             <a:endParaRPr lang="en-US"/>
           </a:p>
@@ -1788,7 +1962,9 @@
         <p:spPr/>
         <p:txBody>
           <a:bodyPr/>
-          <a:lstStyle/>
+          <a:lstStyle>
+            <a:extLst/>
+          </a:lstStyle>
           <a:p>
             <a:fld id="{005A6A02-12DC-46F6-A044-567379ACCB6A}" type="slidenum">
               <a:rPr lang="en-US" smtClean="0"/>
@@ -1834,38 +2010,47 @@
             <p:ph type="title"/>
           </p:nvPr>
         </p:nvSpPr>
+        <p:spPr>
+          <a:xfrm>
+            <a:off x="457200" y="320040"/>
+            <a:ext cx="7242048" cy="1143000"/>
+          </a:xfrm>
+        </p:spPr>
+        <p:txBody>
+          <a:bodyPr/>
+          <a:lstStyle>
+            <a:extLst/>
+          </a:lstStyle>
+          <a:p>
+            <a:r>
+              <a:rPr kumimoji="0" lang="en-US" smtClean="0"/>
+              <a:t>Click to edit Master title style</a:t>
+            </a:r>
+            <a:endParaRPr kumimoji="0" lang="en-US"/>
+          </a:p>
+        </p:txBody>
+      </p:sp>
+      <p:sp>
+        <p:nvSpPr>
+          <p:cNvPr id="3" name="Date Placeholder 2"/>
+          <p:cNvSpPr>
+            <a:spLocks noGrp="1"/>
+          </p:cNvSpPr>
+          <p:nvPr>
+            <p:ph type="dt" sz="half" idx="10"/>
+          </p:nvPr>
+        </p:nvSpPr>
         <p:spPr/>
         <p:txBody>
           <a:bodyPr/>
-          <a:lstStyle/>
-          <a:p>
-            <a:r>
-              <a:rPr lang="en-US" smtClean="0"/>
-              <a:t>Click to edit Master title style</a:t>
-            </a:r>
-            <a:endParaRPr lang="en-US"/>
-          </a:p>
-        </p:txBody>
-      </p:sp>
-      <p:sp>
-        <p:nvSpPr>
-          <p:cNvPr id="3" name="Date Placeholder 2"/>
-          <p:cNvSpPr>
-            <a:spLocks noGrp="1"/>
-          </p:cNvSpPr>
-          <p:nvPr>
-            <p:ph type="dt" sz="half" idx="10"/>
-          </p:nvPr>
-        </p:nvSpPr>
-        <p:spPr/>
-        <p:txBody>
-          <a:bodyPr/>
-          <a:lstStyle/>
+          <a:lstStyle>
+            <a:extLst/>
+          </a:lstStyle>
           <a:p>
             <a:fld id="{0DE4D319-5C32-4967-9BE3-5F657303EA0B}" type="datetimeFigureOut">
               <a:rPr lang="en-US" smtClean="0"/>
               <a:pPr/>
-              <a:t>5/24/2017</a:t>
+              <a:t>5/25/2017</a:t>
             </a:fld>
             <a:endParaRPr lang="en-US"/>
           </a:p>
@@ -1884,7 +2069,9 @@
         <p:spPr/>
         <p:txBody>
           <a:bodyPr/>
-          <a:lstStyle/>
+          <a:lstStyle>
+            <a:extLst/>
+          </a:lstStyle>
           <a:p>
             <a:endParaRPr lang="en-US"/>
           </a:p>
@@ -1903,7 +2090,9 @@
         <p:spPr/>
         <p:txBody>
           <a:bodyPr/>
-          <a:lstStyle/>
+          <a:lstStyle>
+            <a:extLst/>
+          </a:lstStyle>
           <a:p>
             <a:fld id="{005A6A02-12DC-46F6-A044-567379ACCB6A}" type="slidenum">
               <a:rPr lang="en-US" smtClean="0"/>
@@ -1952,12 +2141,21 @@
         <p:spPr/>
         <p:txBody>
           <a:bodyPr/>
-          <a:lstStyle/>
+          <a:lstStyle>
+            <a:lvl1pPr>
+              <a:defRPr>
+                <a:solidFill>
+                  <a:schemeClr val="tx2"/>
+                </a:solidFill>
+              </a:defRPr>
+            </a:lvl1pPr>
+            <a:extLst/>
+          </a:lstStyle>
           <a:p>
             <a:fld id="{0DE4D319-5C32-4967-9BE3-5F657303EA0B}" type="datetimeFigureOut">
               <a:rPr lang="en-US" smtClean="0"/>
               <a:pPr/>
-              <a:t>5/24/2017</a:t>
+              <a:t>5/25/2017</a:t>
             </a:fld>
             <a:endParaRPr lang="en-US"/>
           </a:p>
@@ -1976,7 +2174,16 @@
         <p:spPr/>
         <p:txBody>
           <a:bodyPr/>
-          <a:lstStyle/>
+          <a:lstStyle>
+            <a:lvl1pPr>
+              <a:defRPr>
+                <a:solidFill>
+                  <a:schemeClr val="tx2"/>
+                </a:solidFill>
+              </a:defRPr>
+            </a:lvl1pPr>
+            <a:extLst/>
+          </a:lstStyle>
           <a:p>
             <a:endParaRPr lang="en-US"/>
           </a:p>
@@ -1995,7 +2202,9 @@
         <p:spPr/>
         <p:txBody>
           <a:bodyPr/>
-          <a:lstStyle/>
+          <a:lstStyle>
+            <a:extLst/>
+          </a:lstStyle>
           <a:p>
             <a:fld id="{005A6A02-12DC-46F6-A044-567379ACCB6A}" type="slidenum">
               <a:rPr lang="en-US" smtClean="0"/>
@@ -2043,40 +2252,100 @@
         </p:nvSpPr>
         <p:spPr>
           <a:xfrm>
-            <a:off x="457200" y="273050"/>
-            <a:ext cx="3008313" cy="1162050"/>
-          </a:xfrm>
-        </p:spPr>
-        <p:txBody>
-          <a:bodyPr anchor="b"/>
+            <a:off x="457200" y="228600"/>
+            <a:ext cx="5897880" cy="1173480"/>
+          </a:xfrm>
+        </p:spPr>
+        <p:txBody>
+          <a:bodyPr wrap="square" anchor="b"/>
           <a:lstStyle>
             <a:lvl1pPr algn="l">
-              <a:defRPr sz="2000" b="1"/>
+              <a:buNone/>
+              <a:defRPr lang="en-US" sz="2400" baseline="0" smtClean="0"/>
             </a:lvl1pPr>
-          </a:lstStyle>
-          <a:p>
-            <a:r>
-              <a:rPr lang="en-US" smtClean="0"/>
+            <a:extLst/>
+          </a:lstStyle>
+          <a:p>
+            <a:r>
+              <a:rPr kumimoji="0" lang="en-US" smtClean="0"/>
               <a:t>Click to edit Master title style</a:t>
             </a:r>
-            <a:endParaRPr lang="en-US"/>
-          </a:p>
-        </p:txBody>
-      </p:sp>
-      <p:sp>
-        <p:nvSpPr>
-          <p:cNvPr id="3" name="Content Placeholder 2"/>
-          <p:cNvSpPr>
-            <a:spLocks noGrp="1"/>
-          </p:cNvSpPr>
-          <p:nvPr>
-            <p:ph idx="1"/>
+            <a:endParaRPr kumimoji="0" lang="en-US"/>
+          </a:p>
+        </p:txBody>
+      </p:sp>
+      <p:sp>
+        <p:nvSpPr>
+          <p:cNvPr id="3" name="Text Placeholder 2"/>
+          <p:cNvSpPr>
+            <a:spLocks noGrp="1"/>
+          </p:cNvSpPr>
+          <p:nvPr>
+            <p:ph type="body" idx="2"/>
           </p:nvPr>
         </p:nvSpPr>
         <p:spPr>
           <a:xfrm>
-            <a:off x="3575050" y="273050"/>
-            <a:ext cx="5111750" cy="5853113"/>
+            <a:off x="457200" y="1497416"/>
+            <a:ext cx="5897880" cy="602512"/>
+          </a:xfrm>
+        </p:spPr>
+        <p:txBody>
+          <a:bodyPr rot="0" spcFirstLastPara="0" vertOverflow="overflow" horzOverflow="overflow" vert="horz" wrap="square" lIns="45720" tIns="0" rIns="0" bIns="0" numCol="1" spcCol="0" rtlCol="0" fromWordArt="0" anchor="t" anchorCtr="0" forceAA="0" compatLnSpc="1">
+            <a:normAutofit/>
+          </a:bodyPr>
+          <a:lstStyle>
+            <a:lvl1pPr marL="0" indent="0">
+              <a:spcBef>
+                <a:spcPts val="0"/>
+              </a:spcBef>
+              <a:spcAft>
+                <a:spcPts val="0"/>
+              </a:spcAft>
+              <a:buNone/>
+              <a:defRPr sz="1400"/>
+            </a:lvl1pPr>
+            <a:lvl2pPr>
+              <a:buNone/>
+              <a:defRPr sz="1200"/>
+            </a:lvl2pPr>
+            <a:lvl3pPr>
+              <a:buNone/>
+              <a:defRPr sz="1000"/>
+            </a:lvl3pPr>
+            <a:lvl4pPr>
+              <a:buNone/>
+              <a:defRPr sz="900"/>
+            </a:lvl4pPr>
+            <a:lvl5pPr>
+              <a:buNone/>
+              <a:defRPr sz="900"/>
+            </a:lvl5pPr>
+            <a:extLst/>
+          </a:lstStyle>
+          <a:p>
+            <a:pPr lvl="0" eaLnBrk="1" latinLnBrk="0" hangingPunct="1"/>
+            <a:r>
+              <a:rPr kumimoji="0" lang="en-US" smtClean="0"/>
+              <a:t>Click to edit Master text styles</a:t>
+            </a:r>
+          </a:p>
+        </p:txBody>
+      </p:sp>
+      <p:sp>
+        <p:nvSpPr>
+          <p:cNvPr id="4" name="Content Placeholder 3"/>
+          <p:cNvSpPr>
+            <a:spLocks noGrp="1"/>
+          </p:cNvSpPr>
+          <p:nvPr>
+            <p:ph sz="half" idx="1"/>
+          </p:nvPr>
+        </p:nvSpPr>
+        <p:spPr>
+          <a:xfrm>
+            <a:off x="457200" y="2133600"/>
+            <a:ext cx="7239000" cy="4371752"/>
           </a:xfrm>
         </p:spPr>
         <p:txBody>
@@ -2097,119 +2366,43 @@
             <a:lvl5pPr>
               <a:defRPr sz="2000"/>
             </a:lvl5pPr>
-            <a:lvl6pPr>
-              <a:defRPr sz="2000"/>
-            </a:lvl6pPr>
-            <a:lvl7pPr>
-              <a:defRPr sz="2000"/>
-            </a:lvl7pPr>
-            <a:lvl8pPr>
-              <a:defRPr sz="2000"/>
-            </a:lvl8pPr>
-            <a:lvl9pPr>
-              <a:defRPr sz="2000"/>
-            </a:lvl9pPr>
-          </a:lstStyle>
-          <a:p>
-            <a:pPr lvl="0"/>
+            <a:extLst/>
+          </a:lstStyle>
+          <a:p>
+            <a:pPr lvl="0" eaLnBrk="1" latinLnBrk="0" hangingPunct="1"/>
             <a:r>
               <a:rPr lang="en-US" smtClean="0"/>
               <a:t>Click to edit Master text styles</a:t>
             </a:r>
           </a:p>
           <a:p>
-            <a:pPr lvl="1"/>
+            <a:pPr lvl="1" eaLnBrk="1" latinLnBrk="0" hangingPunct="1"/>
             <a:r>
               <a:rPr lang="en-US" smtClean="0"/>
               <a:t>Second level</a:t>
             </a:r>
           </a:p>
           <a:p>
-            <a:pPr lvl="2"/>
+            <a:pPr lvl="2" eaLnBrk="1" latinLnBrk="0" hangingPunct="1"/>
             <a:r>
               <a:rPr lang="en-US" smtClean="0"/>
               <a:t>Third level</a:t>
             </a:r>
           </a:p>
           <a:p>
-            <a:pPr lvl="3"/>
+            <a:pPr lvl="3" eaLnBrk="1" latinLnBrk="0" hangingPunct="1"/>
             <a:r>
               <a:rPr lang="en-US" smtClean="0"/>
               <a:t>Fourth level</a:t>
             </a:r>
           </a:p>
           <a:p>
-            <a:pPr lvl="4"/>
+            <a:pPr lvl="4" eaLnBrk="1" latinLnBrk="0" hangingPunct="1"/>
             <a:r>
               <a:rPr lang="en-US" smtClean="0"/>
               <a:t>Fifth level</a:t>
             </a:r>
-            <a:endParaRPr lang="en-US"/>
-          </a:p>
-        </p:txBody>
-      </p:sp>
-      <p:sp>
-        <p:nvSpPr>
-          <p:cNvPr id="4" name="Text Placeholder 3"/>
-          <p:cNvSpPr>
-            <a:spLocks noGrp="1"/>
-          </p:cNvSpPr>
-          <p:nvPr>
-            <p:ph type="body" sz="half" idx="2"/>
-          </p:nvPr>
-        </p:nvSpPr>
-        <p:spPr>
-          <a:xfrm>
-            <a:off x="457200" y="1435100"/>
-            <a:ext cx="3008313" cy="4691063"/>
-          </a:xfrm>
-        </p:spPr>
-        <p:txBody>
-          <a:bodyPr/>
-          <a:lstStyle>
-            <a:lvl1pPr marL="0" indent="0">
-              <a:buNone/>
-              <a:defRPr sz="1400"/>
-            </a:lvl1pPr>
-            <a:lvl2pPr marL="457200" indent="0">
-              <a:buNone/>
-              <a:defRPr sz="1200"/>
-            </a:lvl2pPr>
-            <a:lvl3pPr marL="914400" indent="0">
-              <a:buNone/>
-              <a:defRPr sz="1000"/>
-            </a:lvl3pPr>
-            <a:lvl4pPr marL="1371600" indent="0">
-              <a:buNone/>
-              <a:defRPr sz="900"/>
-            </a:lvl4pPr>
-            <a:lvl5pPr marL="1828800" indent="0">
-              <a:buNone/>
-              <a:defRPr sz="900"/>
-            </a:lvl5pPr>
-            <a:lvl6pPr marL="2286000" indent="0">
-              <a:buNone/>
-              <a:defRPr sz="900"/>
-            </a:lvl6pPr>
-            <a:lvl7pPr marL="2743200" indent="0">
-              <a:buNone/>
-              <a:defRPr sz="900"/>
-            </a:lvl7pPr>
-            <a:lvl8pPr marL="3200400" indent="0">
-              <a:buNone/>
-              <a:defRPr sz="900"/>
-            </a:lvl8pPr>
-            <a:lvl9pPr marL="3657600" indent="0">
-              <a:buNone/>
-              <a:defRPr sz="900"/>
-            </a:lvl9pPr>
-          </a:lstStyle>
-          <a:p>
-            <a:pPr lvl="0"/>
-            <a:r>
-              <a:rPr lang="en-US" smtClean="0"/>
-              <a:t>Click to edit Master text styles</a:t>
-            </a:r>
+            <a:endParaRPr kumimoji="0" lang="en-US"/>
           </a:p>
         </p:txBody>
       </p:sp>
@@ -2226,12 +2419,14 @@
         <p:spPr/>
         <p:txBody>
           <a:bodyPr/>
-          <a:lstStyle/>
+          <a:lstStyle>
+            <a:extLst/>
+          </a:lstStyle>
           <a:p>
             <a:fld id="{0DE4D319-5C32-4967-9BE3-5F657303EA0B}" type="datetimeFigureOut">
               <a:rPr lang="en-US" smtClean="0"/>
               <a:pPr/>
-              <a:t>5/24/2017</a:t>
+              <a:t>5/25/2017</a:t>
             </a:fld>
             <a:endParaRPr lang="en-US"/>
           </a:p>
@@ -2250,7 +2445,9 @@
         <p:spPr/>
         <p:txBody>
           <a:bodyPr/>
-          <a:lstStyle/>
+          <a:lstStyle>
+            <a:extLst/>
+          </a:lstStyle>
           <a:p>
             <a:endParaRPr lang="en-US"/>
           </a:p>
@@ -2269,7 +2466,9 @@
         <p:spPr/>
         <p:txBody>
           <a:bodyPr/>
-          <a:lstStyle/>
+          <a:lstStyle>
+            <a:extLst/>
+          </a:lstStyle>
           <a:p>
             <a:fld id="{005A6A02-12DC-46F6-A044-567379ACCB6A}" type="slidenum">
               <a:rPr lang="en-US" smtClean="0"/>
@@ -2289,8 +2488,13 @@
 </file>
 
 <file path=ppt/slideLayouts/slideLayout9.xml><?xml version="1.0" encoding="utf-8"?>
-<p:sldLayout xmlns:a="http://schemas.openxmlformats.org/drawingml/2006/main" xmlns:r="http://schemas.openxmlformats.org/officeDocument/2006/relationships" xmlns:p="http://schemas.openxmlformats.org/presentationml/2006/main" type="picTx" preserve="1">
+<p:sldLayout xmlns:a="http://schemas.openxmlformats.org/drawingml/2006/main" xmlns:r="http://schemas.openxmlformats.org/officeDocument/2006/relationships" xmlns:p="http://schemas.openxmlformats.org/presentationml/2006/main" showMasterSp="0" type="picTx" preserve="1">
   <p:cSld name="Picture with Caption">
+    <p:bg>
+      <p:bgRef idx="1002">
+        <a:schemeClr val="bg2"/>
+      </p:bgRef>
+    </p:bg>
     <p:spTree>
       <p:nvGrpSpPr>
         <p:cNvPr id="1" name=""/>
@@ -2307,6 +2511,118 @@
       </p:grpSpPr>
       <p:sp>
         <p:nvSpPr>
+          <p:cNvPr id="8" name="Rectangle 7"/>
+          <p:cNvSpPr/>
+          <p:nvPr/>
+        </p:nvSpPr>
+        <p:spPr>
+          <a:xfrm rot="21240000">
+            <a:off x="597968" y="1004668"/>
+            <a:ext cx="4319527" cy="4312573"/>
+          </a:xfrm>
+          <a:prstGeom prst="rect">
+            <a:avLst/>
+          </a:prstGeom>
+          <a:solidFill>
+            <a:srgbClr val="FAFAFA"/>
+          </a:solidFill>
+          <a:ln w="1270" cap="rnd" cmpd="sng" algn="ctr">
+            <a:solidFill>
+              <a:srgbClr val="EAEAEA"/>
+            </a:solidFill>
+            <a:prstDash val="solid"/>
+          </a:ln>
+          <a:effectLst>
+            <a:outerShdw blurRad="25000" dist="12700" dir="5400000" algn="t" rotWithShape="0">
+              <a:srgbClr val="000000">
+                <a:alpha val="40000"/>
+              </a:srgbClr>
+            </a:outerShdw>
+          </a:effectLst>
+        </p:spPr>
+        <p:style>
+          <a:lnRef idx="2">
+            <a:schemeClr val="accent1"/>
+          </a:lnRef>
+          <a:fillRef idx="1">
+            <a:schemeClr val="accent1"/>
+          </a:fillRef>
+          <a:effectRef idx="0">
+            <a:schemeClr val="accent1"/>
+          </a:effectRef>
+          <a:fontRef idx="minor">
+            <a:schemeClr val="lt1"/>
+          </a:fontRef>
+        </p:style>
+        <p:txBody>
+          <a:bodyPr rtlCol="0" anchor="ctr"/>
+          <a:lstStyle>
+            <a:extLst/>
+          </a:lstStyle>
+          <a:p>
+            <a:pPr algn="ctr" eaLnBrk="1" latinLnBrk="0" hangingPunct="1"/>
+            <a:endParaRPr kumimoji="0" lang="en-US"/>
+          </a:p>
+        </p:txBody>
+      </p:sp>
+      <p:sp>
+        <p:nvSpPr>
+          <p:cNvPr id="9" name="Rectangle 8"/>
+          <p:cNvSpPr/>
+          <p:nvPr/>
+        </p:nvSpPr>
+        <p:spPr>
+          <a:xfrm rot="21420000">
+            <a:off x="596706" y="998816"/>
+            <a:ext cx="4319527" cy="4312573"/>
+          </a:xfrm>
+          <a:prstGeom prst="rect">
+            <a:avLst/>
+          </a:prstGeom>
+          <a:solidFill>
+            <a:srgbClr val="FAFAFA"/>
+          </a:solidFill>
+          <a:ln w="1270" cap="rnd" cmpd="sng" algn="ctr">
+            <a:solidFill>
+              <a:srgbClr val="EAEAEA"/>
+            </a:solidFill>
+            <a:prstDash val="solid"/>
+          </a:ln>
+          <a:effectLst>
+            <a:outerShdw blurRad="28000" dist="12700" dir="5400000" algn="tl" rotWithShape="0">
+              <a:srgbClr val="000000">
+                <a:alpha val="40000"/>
+              </a:srgbClr>
+            </a:outerShdw>
+          </a:effectLst>
+        </p:spPr>
+        <p:style>
+          <a:lnRef idx="2">
+            <a:schemeClr val="accent1"/>
+          </a:lnRef>
+          <a:fillRef idx="1">
+            <a:schemeClr val="accent1"/>
+          </a:fillRef>
+          <a:effectRef idx="0">
+            <a:schemeClr val="accent1"/>
+          </a:effectRef>
+          <a:fontRef idx="minor">
+            <a:schemeClr val="lt1"/>
+          </a:fontRef>
+        </p:style>
+        <p:txBody>
+          <a:bodyPr rtlCol="0" anchor="ctr"/>
+          <a:lstStyle>
+            <a:extLst/>
+          </a:lstStyle>
+          <a:p>
+            <a:pPr algn="ctr" eaLnBrk="1" latinLnBrk="0" hangingPunct="1"/>
+            <a:endParaRPr kumimoji="0" lang="en-US"/>
+          </a:p>
+        </p:txBody>
+      </p:sp>
+      <p:sp>
+        <p:nvSpPr>
           <p:cNvPr id="2" name="Title 1"/>
           <p:cNvSpPr>
             <a:spLocks noGrp="1"/>
@@ -2317,29 +2633,221 @@
         </p:nvSpPr>
         <p:spPr>
           <a:xfrm>
-            <a:off x="1792288" y="4800600"/>
-            <a:ext cx="5486400" cy="566738"/>
-          </a:xfrm>
-        </p:spPr>
-        <p:txBody>
-          <a:bodyPr anchor="b"/>
+            <a:off x="5389098" y="1143000"/>
+            <a:ext cx="3429000" cy="2057400"/>
+          </a:xfrm>
+        </p:spPr>
+        <p:txBody>
+          <a:bodyPr vert="horz" anchor="b"/>
           <a:lstStyle>
             <a:lvl1pPr algn="l">
-              <a:defRPr sz="2000" b="1"/>
+              <a:buNone/>
+              <a:defRPr sz="3000" b="1" baseline="0">
+                <a:ln w="500">
+                  <a:solidFill>
+                    <a:schemeClr val="tx2">
+                      <a:shade val="10000"/>
+                      <a:satMod val="135000"/>
+                    </a:schemeClr>
+                  </a:solidFill>
+                </a:ln>
+                <a:gradFill>
+                  <a:gsLst>
+                    <a:gs pos="0">
+                      <a:schemeClr val="accent4">
+                        <a:tint val="13000"/>
+                      </a:schemeClr>
+                    </a:gs>
+                    <a:gs pos="10000">
+                      <a:schemeClr val="accent4">
+                        <a:tint val="20000"/>
+                      </a:schemeClr>
+                    </a:gs>
+                    <a:gs pos="49000">
+                      <a:schemeClr val="accent4">
+                        <a:tint val="70000"/>
+                      </a:schemeClr>
+                    </a:gs>
+                    <a:gs pos="50000">
+                      <a:schemeClr val="accent4">
+                        <a:tint val="97000"/>
+                      </a:schemeClr>
+                    </a:gs>
+                    <a:gs pos="100000">
+                      <a:schemeClr val="accent4">
+                        <a:tint val="20000"/>
+                      </a:schemeClr>
+                    </a:gs>
+                  </a:gsLst>
+                  <a:lin ang="5400000" scaled="1"/>
+                </a:gradFill>
+                <a:effectLst/>
+              </a:defRPr>
             </a:lvl1pPr>
-          </a:lstStyle>
-          <a:p>
-            <a:r>
-              <a:rPr lang="en-US" smtClean="0"/>
+            <a:extLst/>
+          </a:lstStyle>
+          <a:p>
+            <a:r>
+              <a:rPr kumimoji="0" lang="en-US" smtClean="0"/>
               <a:t>Click to edit Master title style</a:t>
             </a:r>
+            <a:endParaRPr kumimoji="0" lang="en-US" dirty="0"/>
+          </a:p>
+        </p:txBody>
+      </p:sp>
+      <p:sp>
+        <p:nvSpPr>
+          <p:cNvPr id="4" name="Text Placeholder 3"/>
+          <p:cNvSpPr>
+            <a:spLocks noGrp="1"/>
+          </p:cNvSpPr>
+          <p:nvPr>
+            <p:ph type="body" sz="half" idx="2"/>
+          </p:nvPr>
+        </p:nvSpPr>
+        <p:spPr>
+          <a:xfrm>
+            <a:off x="5389098" y="3283634"/>
+            <a:ext cx="3429000" cy="1920240"/>
+          </a:xfrm>
+        </p:spPr>
+        <p:txBody>
+          <a:bodyPr rot="0" spcFirstLastPara="0" vertOverflow="overflow" horzOverflow="overflow" vert="horz" wrap="square" lIns="82296" tIns="0" rIns="0" bIns="0" numCol="1" spcCol="0" rtlCol="0" fromWordArt="0" anchor="t" anchorCtr="0" forceAA="0" compatLnSpc="1">
+            <a:normAutofit/>
+          </a:bodyPr>
+          <a:lstStyle>
+            <a:lvl1pPr marL="0" indent="0">
+              <a:lnSpc>
+                <a:spcPct val="100000"/>
+              </a:lnSpc>
+              <a:spcBef>
+                <a:spcPts val="0"/>
+              </a:spcBef>
+              <a:buFontTx/>
+              <a:buNone/>
+              <a:defRPr sz="1400" baseline="0">
+                <a:solidFill>
+                  <a:schemeClr val="tx1"/>
+                </a:solidFill>
+              </a:defRPr>
+            </a:lvl1pPr>
+            <a:lvl2pPr>
+              <a:defRPr sz="1200"/>
+            </a:lvl2pPr>
+            <a:lvl3pPr>
+              <a:defRPr sz="1000"/>
+            </a:lvl3pPr>
+            <a:lvl4pPr>
+              <a:defRPr sz="900"/>
+            </a:lvl4pPr>
+            <a:lvl5pPr>
+              <a:defRPr sz="900"/>
+            </a:lvl5pPr>
+            <a:extLst/>
+          </a:lstStyle>
+          <a:p>
+            <a:pPr marL="0" marR="0" lvl="0" indent="0" algn="l" defTabSz="0" rtl="0" eaLnBrk="1" fontAlgn="auto" latinLnBrk="0" hangingPunct="1">
+              <a:lnSpc>
+                <a:spcPct val="100000"/>
+              </a:lnSpc>
+              <a:spcBef>
+                <a:spcPts val="0"/>
+              </a:spcBef>
+              <a:spcAft>
+                <a:spcPts val="0"/>
+              </a:spcAft>
+              <a:buClr>
+                <a:schemeClr val="tx2"/>
+              </a:buClr>
+              <a:buSzPct val="73000"/>
+              <a:buFontTx/>
+              <a:buNone/>
+              <a:tabLst/>
+              <a:defRPr/>
+            </a:pPr>
+            <a:r>
+              <a:rPr kumimoji="0" lang="en-US" smtClean="0"/>
+              <a:t>Click to edit Master text styles</a:t>
+            </a:r>
+          </a:p>
+        </p:txBody>
+      </p:sp>
+      <p:sp>
+        <p:nvSpPr>
+          <p:cNvPr id="5" name="Date Placeholder 4"/>
+          <p:cNvSpPr>
+            <a:spLocks noGrp="1"/>
+          </p:cNvSpPr>
+          <p:nvPr>
+            <p:ph type="dt" sz="half" idx="10"/>
+          </p:nvPr>
+        </p:nvSpPr>
+        <p:spPr/>
+        <p:txBody>
+          <a:bodyPr/>
+          <a:lstStyle>
+            <a:extLst/>
+          </a:lstStyle>
+          <a:p>
+            <a:fld id="{0DE4D319-5C32-4967-9BE3-5F657303EA0B}" type="datetimeFigureOut">
+              <a:rPr lang="en-US" smtClean="0"/>
+              <a:pPr/>
+              <a:t>5/25/2017</a:t>
+            </a:fld>
             <a:endParaRPr lang="en-US"/>
           </a:p>
         </p:txBody>
       </p:sp>
       <p:sp>
         <p:nvSpPr>
-          <p:cNvPr id="3" name="Picture Placeholder 2"/>
+          <p:cNvPr id="6" name="Footer Placeholder 5"/>
+          <p:cNvSpPr>
+            <a:spLocks noGrp="1"/>
+          </p:cNvSpPr>
+          <p:nvPr>
+            <p:ph type="ftr" sz="quarter" idx="11"/>
+          </p:nvPr>
+        </p:nvSpPr>
+        <p:spPr/>
+        <p:txBody>
+          <a:bodyPr/>
+          <a:lstStyle>
+            <a:extLst/>
+          </a:lstStyle>
+          <a:p>
+            <a:endParaRPr lang="en-US"/>
+          </a:p>
+        </p:txBody>
+      </p:sp>
+      <p:sp>
+        <p:nvSpPr>
+          <p:cNvPr id="7" name="Slide Number Placeholder 6"/>
+          <p:cNvSpPr>
+            <a:spLocks noGrp="1"/>
+          </p:cNvSpPr>
+          <p:nvPr>
+            <p:ph type="sldNum" sz="quarter" idx="12"/>
+          </p:nvPr>
+        </p:nvSpPr>
+        <p:spPr/>
+        <p:txBody>
+          <a:bodyPr/>
+          <a:lstStyle>
+            <a:extLst/>
+          </a:lstStyle>
+          <a:p>
+            <a:fld id="{005A6A02-12DC-46F6-A044-567379ACCB6A}" type="slidenum">
+              <a:rPr lang="en-US" smtClean="0"/>
+              <a:pPr/>
+              <a:t>‹#›</a:t>
+            </a:fld>
+            <a:endParaRPr lang="en-US"/>
+          </a:p>
+        </p:txBody>
+      </p:sp>
+      <p:sp>
+        <p:nvSpPr>
+          <p:cNvPr id="10" name="Picture Placeholder 9"/>
           <p:cNvSpPr>
             <a:spLocks noGrp="1"/>
           </p:cNvSpPr>
@@ -2349,9 +2857,36 @@
         </p:nvSpPr>
         <p:spPr>
           <a:xfrm>
-            <a:off x="1792288" y="612775"/>
-            <a:ext cx="5486400" cy="4114800"/>
-          </a:xfrm>
+            <a:off x="663682" y="1041002"/>
+            <a:ext cx="4206240" cy="4206240"/>
+          </a:xfrm>
+          <a:solidFill>
+            <a:schemeClr val="bg2">
+              <a:shade val="50000"/>
+            </a:schemeClr>
+          </a:solidFill>
+          <a:ln w="107950">
+            <a:solidFill>
+              <a:srgbClr val="FFFFFF"/>
+            </a:solidFill>
+            <a:miter lim="800000"/>
+          </a:ln>
+          <a:effectLst>
+            <a:outerShdw blurRad="44450" dist="3810" dir="5400000" algn="tl" rotWithShape="0">
+              <a:srgbClr val="000000">
+                <a:alpha val="60000"/>
+              </a:srgbClr>
+            </a:outerShdw>
+          </a:effectLst>
+          <a:scene3d>
+            <a:camera prst="orthographicFront"/>
+            <a:lightRig rig="threePt" dir="t"/>
+          </a:scene3d>
+          <a:sp3d contourW="3810">
+            <a:contourClr>
+              <a:srgbClr val="969696"/>
+            </a:contourClr>
+          </a:sp3d>
         </p:spPr>
         <p:txBody>
           <a:bodyPr/>
@@ -2360,180 +2895,21 @@
               <a:buNone/>
               <a:defRPr sz="3200"/>
             </a:lvl1pPr>
-            <a:lvl2pPr marL="457200" indent="0">
-              <a:buNone/>
-              <a:defRPr sz="2800"/>
-            </a:lvl2pPr>
-            <a:lvl3pPr marL="914400" indent="0">
-              <a:buNone/>
-              <a:defRPr sz="2400"/>
-            </a:lvl3pPr>
-            <a:lvl4pPr marL="1371600" indent="0">
-              <a:buNone/>
-              <a:defRPr sz="2000"/>
-            </a:lvl4pPr>
-            <a:lvl5pPr marL="1828800" indent="0">
-              <a:buNone/>
-              <a:defRPr sz="2000"/>
-            </a:lvl5pPr>
-            <a:lvl6pPr marL="2286000" indent="0">
-              <a:buNone/>
-              <a:defRPr sz="2000"/>
-            </a:lvl6pPr>
-            <a:lvl7pPr marL="2743200" indent="0">
-              <a:buNone/>
-              <a:defRPr sz="2000"/>
-            </a:lvl7pPr>
-            <a:lvl8pPr marL="3200400" indent="0">
-              <a:buNone/>
-              <a:defRPr sz="2000"/>
-            </a:lvl8pPr>
-            <a:lvl9pPr marL="3657600" indent="0">
-              <a:buNone/>
-              <a:defRPr sz="2000"/>
-            </a:lvl9pPr>
-          </a:lstStyle>
-          <a:p>
-            <a:endParaRPr lang="en-US"/>
-          </a:p>
-        </p:txBody>
-      </p:sp>
-      <p:sp>
-        <p:nvSpPr>
-          <p:cNvPr id="4" name="Text Placeholder 3"/>
-          <p:cNvSpPr>
-            <a:spLocks noGrp="1"/>
-          </p:cNvSpPr>
-          <p:nvPr>
-            <p:ph type="body" sz="half" idx="2"/>
-          </p:nvPr>
-        </p:nvSpPr>
-        <p:spPr>
-          <a:xfrm>
-            <a:off x="1792288" y="5367338"/>
-            <a:ext cx="5486400" cy="804862"/>
-          </a:xfrm>
-        </p:spPr>
-        <p:txBody>
-          <a:bodyPr/>
-          <a:lstStyle>
-            <a:lvl1pPr marL="0" indent="0">
-              <a:buNone/>
-              <a:defRPr sz="1400"/>
-            </a:lvl1pPr>
-            <a:lvl2pPr marL="457200" indent="0">
-              <a:buNone/>
-              <a:defRPr sz="1200"/>
-            </a:lvl2pPr>
-            <a:lvl3pPr marL="914400" indent="0">
-              <a:buNone/>
-              <a:defRPr sz="1000"/>
-            </a:lvl3pPr>
-            <a:lvl4pPr marL="1371600" indent="0">
-              <a:buNone/>
-              <a:defRPr sz="900"/>
-            </a:lvl4pPr>
-            <a:lvl5pPr marL="1828800" indent="0">
-              <a:buNone/>
-              <a:defRPr sz="900"/>
-            </a:lvl5pPr>
-            <a:lvl6pPr marL="2286000" indent="0">
-              <a:buNone/>
-              <a:defRPr sz="900"/>
-            </a:lvl6pPr>
-            <a:lvl7pPr marL="2743200" indent="0">
-              <a:buNone/>
-              <a:defRPr sz="900"/>
-            </a:lvl7pPr>
-            <a:lvl8pPr marL="3200400" indent="0">
-              <a:buNone/>
-              <a:defRPr sz="900"/>
-            </a:lvl8pPr>
-            <a:lvl9pPr marL="3657600" indent="0">
-              <a:buNone/>
-              <a:defRPr sz="900"/>
-            </a:lvl9pPr>
-          </a:lstStyle>
-          <a:p>
-            <a:pPr lvl="0"/>
-            <a:r>
-              <a:rPr lang="en-US" smtClean="0"/>
-              <a:t>Click to edit Master text styles</a:t>
-            </a:r>
-          </a:p>
-        </p:txBody>
-      </p:sp>
-      <p:sp>
-        <p:nvSpPr>
-          <p:cNvPr id="5" name="Date Placeholder 4"/>
-          <p:cNvSpPr>
-            <a:spLocks noGrp="1"/>
-          </p:cNvSpPr>
-          <p:nvPr>
-            <p:ph type="dt" sz="half" idx="10"/>
-          </p:nvPr>
-        </p:nvSpPr>
-        <p:spPr/>
-        <p:txBody>
-          <a:bodyPr/>
-          <a:lstStyle/>
-          <a:p>
-            <a:fld id="{0DE4D319-5C32-4967-9BE3-5F657303EA0B}" type="datetimeFigureOut">
-              <a:rPr lang="en-US" smtClean="0"/>
-              <a:pPr/>
-              <a:t>5/24/2017</a:t>
-            </a:fld>
-            <a:endParaRPr lang="en-US"/>
-          </a:p>
-        </p:txBody>
-      </p:sp>
-      <p:sp>
-        <p:nvSpPr>
-          <p:cNvPr id="6" name="Footer Placeholder 5"/>
-          <p:cNvSpPr>
-            <a:spLocks noGrp="1"/>
-          </p:cNvSpPr>
-          <p:nvPr>
-            <p:ph type="ftr" sz="quarter" idx="11"/>
-          </p:nvPr>
-        </p:nvSpPr>
-        <p:spPr/>
-        <p:txBody>
-          <a:bodyPr/>
-          <a:lstStyle/>
-          <a:p>
-            <a:endParaRPr lang="en-US"/>
-          </a:p>
-        </p:txBody>
-      </p:sp>
-      <p:sp>
-        <p:nvSpPr>
-          <p:cNvPr id="7" name="Slide Number Placeholder 6"/>
-          <p:cNvSpPr>
-            <a:spLocks noGrp="1"/>
-          </p:cNvSpPr>
-          <p:nvPr>
-            <p:ph type="sldNum" sz="quarter" idx="12"/>
-          </p:nvPr>
-        </p:nvSpPr>
-        <p:spPr/>
-        <p:txBody>
-          <a:bodyPr/>
-          <a:lstStyle/>
-          <a:p>
-            <a:fld id="{005A6A02-12DC-46F6-A044-567379ACCB6A}" type="slidenum">
-              <a:rPr lang="en-US" smtClean="0"/>
-              <a:pPr/>
-              <a:t>‹#›</a:t>
-            </a:fld>
-            <a:endParaRPr lang="en-US"/>
+            <a:extLst/>
+          </a:lstStyle>
+          <a:p>
+            <a:r>
+              <a:rPr kumimoji="0" lang="en-US" smtClean="0"/>
+              <a:t>Click icon to add picture</a:t>
+            </a:r>
+            <a:endParaRPr kumimoji="0" lang="en-US" dirty="0"/>
           </a:p>
         </p:txBody>
       </p:sp>
     </p:spTree>
   </p:cSld>
   <p:clrMapOvr>
-    <a:masterClrMapping/>
+    <a:overrideClrMapping bg1="dk1" tx1="lt1" bg2="dk2" tx2="lt2" accent1="accent1" accent2="accent2" accent3="accent3" accent4="accent4" accent5="accent5" accent6="accent6" hlink="hlink" folHlink="folHlink"/>
   </p:clrMapOvr>
 </p:sldLayout>
 </file>
@@ -2562,136 +2938,218 @@
       </p:grpSpPr>
       <p:sp>
         <p:nvSpPr>
-          <p:cNvPr id="2" name="Title Placeholder 1"/>
-          <p:cNvSpPr>
-            <a:spLocks noGrp="1"/>
-          </p:cNvSpPr>
-          <p:nvPr>
-            <p:ph type="title"/>
-          </p:nvPr>
-        </p:nvSpPr>
-        <p:spPr>
-          <a:xfrm>
-            <a:off x="457200" y="274638"/>
-            <a:ext cx="8229600" cy="1143000"/>
+          <p:cNvPr id="9" name="Rectangle 8"/>
+          <p:cNvSpPr/>
+          <p:nvPr/>
+        </p:nvSpPr>
+        <p:spPr>
+          <a:xfrm flipH="1">
+            <a:off x="8153400" y="0"/>
+            <a:ext cx="990600" cy="6858000"/>
           </a:xfrm>
           <a:prstGeom prst="rect">
             <a:avLst/>
           </a:prstGeom>
-        </p:spPr>
-        <p:txBody>
-          <a:bodyPr vert="horz" lIns="91440" tIns="45720" rIns="91440" bIns="45720" rtlCol="0" anchor="ctr">
-            <a:normAutofit/>
-          </a:bodyPr>
-          <a:lstStyle/>
-          <a:p>
-            <a:r>
-              <a:rPr lang="en-US" smtClean="0"/>
-              <a:t>Click to edit Master title style</a:t>
-            </a:r>
-            <a:endParaRPr lang="en-US"/>
-          </a:p>
-        </p:txBody>
-      </p:sp>
-      <p:sp>
-        <p:nvSpPr>
-          <p:cNvPr id="3" name="Text Placeholder 2"/>
-          <p:cNvSpPr>
-            <a:spLocks noGrp="1"/>
-          </p:cNvSpPr>
-          <p:nvPr>
-            <p:ph type="body" idx="1"/>
+          <a:blipFill>
+            <a:blip r:embed="rId13">
+              <a:alphaModFix amt="43000"/>
+            </a:blip>
+            <a:tile tx="0" ty="0" sx="50000" sy="50000" flip="none" algn="tl"/>
+          </a:blipFill>
+          <a:ln w="0" cap="flat" cmpd="sng" algn="ctr">
+            <a:noFill/>
+            <a:prstDash val="solid"/>
+          </a:ln>
+          <a:effectLst>
+            <a:fillOverlay blend="mult">
+              <a:gradFill rotWithShape="1">
+                <a:gsLst>
+                  <a:gs pos="0">
+                    <a:schemeClr val="tx2">
+                      <a:tint val="62000"/>
+                      <a:satMod val="420000"/>
+                    </a:schemeClr>
+                  </a:gs>
+                  <a:gs pos="100000">
+                    <a:schemeClr val="tx2">
+                      <a:shade val="20000"/>
+                      <a:satMod val="170000"/>
+                    </a:schemeClr>
+                  </a:gs>
+                </a:gsLst>
+                <a:path path="circle">
+                  <a:fillToRect l="50000" t="110000" r="50000" b="-10000"/>
+                </a:path>
+                <a:tileRect/>
+              </a:gradFill>
+            </a:fillOverlay>
+            <a:innerShdw blurRad="63500" dist="44450" dir="10800000">
+              <a:srgbClr val="000000">
+                <a:alpha val="45000"/>
+              </a:srgbClr>
+            </a:innerShdw>
+          </a:effectLst>
+        </p:spPr>
+        <p:style>
+          <a:lnRef idx="3">
+            <a:schemeClr val="lt1"/>
+          </a:lnRef>
+          <a:fillRef idx="1">
+            <a:schemeClr val="accent1"/>
+          </a:fillRef>
+          <a:effectRef idx="1">
+            <a:schemeClr val="accent1"/>
+          </a:effectRef>
+          <a:fontRef idx="minor">
+            <a:schemeClr val="lt1"/>
+          </a:fontRef>
+        </p:style>
+        <p:txBody>
+          <a:bodyPr anchor="ctr"/>
+          <a:lstStyle>
+            <a:extLst/>
+          </a:lstStyle>
+          <a:p>
+            <a:pPr algn="ctr" eaLnBrk="1" latinLnBrk="0" hangingPunct="1"/>
+            <a:endParaRPr kumimoji="0" lang="en-US"/>
+          </a:p>
+        </p:txBody>
+      </p:sp>
+      <p:sp>
+        <p:nvSpPr>
+          <p:cNvPr id="3" name="Title Placeholder 2"/>
+          <p:cNvSpPr>
+            <a:spLocks noGrp="1"/>
+          </p:cNvSpPr>
+          <p:nvPr>
+            <p:ph type="title"/>
           </p:nvPr>
         </p:nvSpPr>
         <p:spPr>
           <a:xfrm>
-            <a:off x="457200" y="1600200"/>
-            <a:ext cx="8229600" cy="4525963"/>
+            <a:off x="457200" y="320040"/>
+            <a:ext cx="7239000" cy="1143000"/>
           </a:xfrm>
           <a:prstGeom prst="rect">
             <a:avLst/>
           </a:prstGeom>
         </p:spPr>
         <p:txBody>
-          <a:bodyPr vert="horz" lIns="91440" tIns="45720" rIns="91440" bIns="45720" rtlCol="0">
+          <a:bodyPr vert="horz" lIns="45720" tIns="0" rIns="45720" bIns="0" anchor="b" anchorCtr="0">
             <a:normAutofit/>
           </a:bodyPr>
-          <a:lstStyle/>
-          <a:p>
-            <a:pPr lvl="0"/>
-            <a:r>
-              <a:rPr lang="en-US" smtClean="0"/>
-              <a:t>Click to edit Master text styles</a:t>
-            </a:r>
-          </a:p>
-          <a:p>
-            <a:pPr lvl="1"/>
-            <a:r>
-              <a:rPr lang="en-US" smtClean="0"/>
-              <a:t>Second level</a:t>
-            </a:r>
-          </a:p>
-          <a:p>
-            <a:pPr lvl="2"/>
-            <a:r>
-              <a:rPr lang="en-US" smtClean="0"/>
-              <a:t>Third level</a:t>
-            </a:r>
-          </a:p>
-          <a:p>
-            <a:pPr lvl="3"/>
-            <a:r>
-              <a:rPr lang="en-US" smtClean="0"/>
-              <a:t>Fourth level</a:t>
-            </a:r>
-          </a:p>
-          <a:p>
-            <a:pPr lvl="4"/>
-            <a:r>
-              <a:rPr lang="en-US" smtClean="0"/>
-              <a:t>Fifth level</a:t>
-            </a:r>
-            <a:endParaRPr lang="en-US"/>
-          </a:p>
-        </p:txBody>
-      </p:sp>
-      <p:sp>
-        <p:nvSpPr>
-          <p:cNvPr id="4" name="Date Placeholder 3"/>
-          <p:cNvSpPr>
-            <a:spLocks noGrp="1"/>
-          </p:cNvSpPr>
-          <p:nvPr>
-            <p:ph type="dt" sz="half" idx="2"/>
+          <a:lstStyle>
+            <a:extLst/>
+          </a:lstStyle>
+          <a:p>
+            <a:r>
+              <a:rPr kumimoji="0" lang="en-US" smtClean="0"/>
+              <a:t>Click to edit Master title style</a:t>
+            </a:r>
+            <a:endParaRPr kumimoji="0" lang="en-US"/>
+          </a:p>
+        </p:txBody>
+      </p:sp>
+      <p:sp>
+        <p:nvSpPr>
+          <p:cNvPr id="31" name="Text Placeholder 30"/>
+          <p:cNvSpPr>
+            <a:spLocks noGrp="1"/>
+          </p:cNvSpPr>
+          <p:nvPr>
+            <p:ph type="body" idx="1"/>
           </p:nvPr>
         </p:nvSpPr>
         <p:spPr>
           <a:xfrm>
-            <a:off x="457200" y="6356350"/>
-            <a:ext cx="2133600" cy="365125"/>
+            <a:off x="457200" y="1609416"/>
+            <a:ext cx="7239000" cy="4846320"/>
           </a:xfrm>
           <a:prstGeom prst="rect">
             <a:avLst/>
           </a:prstGeom>
         </p:spPr>
         <p:txBody>
-          <a:bodyPr vert="horz" lIns="91440" tIns="45720" rIns="91440" bIns="45720" rtlCol="0" anchor="ctr"/>
-          <a:lstStyle>
-            <a:lvl1pPr algn="l">
-              <a:defRPr sz="1200">
+          <a:bodyPr vert="horz">
+            <a:normAutofit/>
+          </a:bodyPr>
+          <a:lstStyle>
+            <a:extLst/>
+          </a:lstStyle>
+          <a:p>
+            <a:pPr lvl="0" eaLnBrk="1" latinLnBrk="0" hangingPunct="1"/>
+            <a:r>
+              <a:rPr kumimoji="0" lang="en-US" smtClean="0"/>
+              <a:t>Click to edit Master text styles</a:t>
+            </a:r>
+          </a:p>
+          <a:p>
+            <a:pPr lvl="1" eaLnBrk="1" latinLnBrk="0" hangingPunct="1"/>
+            <a:r>
+              <a:rPr kumimoji="0" lang="en-US" smtClean="0"/>
+              <a:t>Second level</a:t>
+            </a:r>
+          </a:p>
+          <a:p>
+            <a:pPr lvl="2" eaLnBrk="1" latinLnBrk="0" hangingPunct="1"/>
+            <a:r>
+              <a:rPr kumimoji="0" lang="en-US" smtClean="0"/>
+              <a:t>Third level</a:t>
+            </a:r>
+          </a:p>
+          <a:p>
+            <a:pPr lvl="3" eaLnBrk="1" latinLnBrk="0" hangingPunct="1"/>
+            <a:r>
+              <a:rPr kumimoji="0" lang="en-US" smtClean="0"/>
+              <a:t>Fourth level</a:t>
+            </a:r>
+          </a:p>
+          <a:p>
+            <a:pPr lvl="4" eaLnBrk="1" latinLnBrk="0" hangingPunct="1"/>
+            <a:r>
+              <a:rPr kumimoji="0" lang="en-US" smtClean="0"/>
+              <a:t>Fifth level</a:t>
+            </a:r>
+            <a:endParaRPr kumimoji="0" lang="en-US"/>
+          </a:p>
+        </p:txBody>
+      </p:sp>
+      <p:sp>
+        <p:nvSpPr>
+          <p:cNvPr id="27" name="Date Placeholder 26"/>
+          <p:cNvSpPr>
+            <a:spLocks noGrp="1"/>
+          </p:cNvSpPr>
+          <p:nvPr>
+            <p:ph type="dt" sz="half" idx="2"/>
+          </p:nvPr>
+        </p:nvSpPr>
+        <p:spPr>
+          <a:xfrm>
+            <a:off x="4245936" y="6557946"/>
+            <a:ext cx="2002464" cy="226902"/>
+          </a:xfrm>
+          <a:prstGeom prst="rect">
+            <a:avLst/>
+          </a:prstGeom>
+        </p:spPr>
+        <p:txBody>
+          <a:bodyPr vert="horz" tIns="0" bIns="0" anchor="b"/>
+          <a:lstStyle>
+            <a:lvl1pPr algn="l" eaLnBrk="1" latinLnBrk="0" hangingPunct="1">
+              <a:defRPr kumimoji="0" sz="1000">
                 <a:solidFill>
-                  <a:schemeClr val="tx1">
-                    <a:tint val="75000"/>
-                  </a:schemeClr>
+                  <a:schemeClr val="tx2"/>
                 </a:solidFill>
               </a:defRPr>
             </a:lvl1pPr>
+            <a:extLst/>
           </a:lstStyle>
           <a:p>
             <a:fld id="{0DE4D319-5C32-4967-9BE3-5F657303EA0B}" type="datetimeFigureOut">
               <a:rPr lang="en-US" smtClean="0"/>
               <a:pPr/>
-              <a:t>5/24/2017</a:t>
+              <a:t>5/25/2017</a:t>
             </a:fld>
             <a:endParaRPr lang="en-US"/>
           </a:p>
@@ -2699,7 +3157,7 @@
       </p:sp>
       <p:sp>
         <p:nvSpPr>
-          <p:cNvPr id="5" name="Footer Placeholder 4"/>
+          <p:cNvPr id="4" name="Footer Placeholder 3"/>
           <p:cNvSpPr>
             <a:spLocks noGrp="1"/>
           </p:cNvSpPr>
@@ -2709,25 +3167,24 @@
         </p:nvSpPr>
         <p:spPr>
           <a:xfrm>
-            <a:off x="3124200" y="6356350"/>
-            <a:ext cx="2895600" cy="365125"/>
+            <a:off x="457200" y="6557946"/>
+            <a:ext cx="3657600" cy="228600"/>
           </a:xfrm>
           <a:prstGeom prst="rect">
             <a:avLst/>
           </a:prstGeom>
         </p:spPr>
         <p:txBody>
-          <a:bodyPr vert="horz" lIns="91440" tIns="45720" rIns="91440" bIns="45720" rtlCol="0" anchor="ctr"/>
-          <a:lstStyle>
-            <a:lvl1pPr algn="ctr">
-              <a:defRPr sz="1200">
+          <a:bodyPr vert="horz" tIns="0" bIns="0" anchor="b"/>
+          <a:lstStyle>
+            <a:lvl1pPr algn="r" eaLnBrk="1" latinLnBrk="0" hangingPunct="1">
+              <a:defRPr kumimoji="0" sz="1000">
                 <a:solidFill>
-                  <a:schemeClr val="tx1">
-                    <a:tint val="75000"/>
-                  </a:schemeClr>
+                  <a:schemeClr val="tx2"/>
                 </a:solidFill>
               </a:defRPr>
             </a:lvl1pPr>
+            <a:extLst/>
           </a:lstStyle>
           <a:p>
             <a:endParaRPr lang="en-US"/>
@@ -2736,7 +3193,7 @@
       </p:sp>
       <p:sp>
         <p:nvSpPr>
-          <p:cNvPr id="6" name="Slide Number Placeholder 5"/>
+          <p:cNvPr id="16" name="Slide Number Placeholder 15"/>
           <p:cNvSpPr>
             <a:spLocks noGrp="1"/>
           </p:cNvSpPr>
@@ -2746,25 +3203,24 @@
         </p:nvSpPr>
         <p:spPr>
           <a:xfrm>
-            <a:off x="6553200" y="6356350"/>
-            <a:ext cx="2133600" cy="365125"/>
+            <a:off x="6251448" y="6556248"/>
+            <a:ext cx="588336" cy="228600"/>
           </a:xfrm>
           <a:prstGeom prst="rect">
             <a:avLst/>
           </a:prstGeom>
         </p:spPr>
         <p:txBody>
-          <a:bodyPr vert="horz" lIns="91440" tIns="45720" rIns="91440" bIns="45720" rtlCol="0" anchor="ctr"/>
-          <a:lstStyle>
-            <a:lvl1pPr algn="r">
-              <a:defRPr sz="1200">
+          <a:bodyPr vert="horz" lIns="0" tIns="0" rIns="0" bIns="0" anchor="b"/>
+          <a:lstStyle>
+            <a:lvl1pPr algn="r" eaLnBrk="1" latinLnBrk="0" hangingPunct="1">
+              <a:defRPr kumimoji="0" sz="1100">
                 <a:solidFill>
-                  <a:schemeClr val="tx1">
-                    <a:tint val="75000"/>
-                  </a:schemeClr>
+                  <a:schemeClr val="tx2"/>
                 </a:solidFill>
               </a:defRPr>
             </a:lvl1pPr>
+            <a:extLst/>
           </a:lstStyle>
           <a:p>
             <a:fld id="{005A6A02-12DC-46F6-A044-567379ACCB6A}" type="slidenum">
@@ -2780,43 +3236,84 @@
   </p:cSld>
   <p:clrMap bg1="lt1" tx1="dk1" bg2="lt2" tx2="dk2" accent1="accent1" accent2="accent2" accent3="accent3" accent4="accent4" accent5="accent5" accent6="accent6" hlink="hlink" folHlink="folHlink"/>
   <p:sldLayoutIdLst>
-    <p:sldLayoutId id="2147483649" r:id="rId1"/>
-    <p:sldLayoutId id="2147483650" r:id="rId2"/>
-    <p:sldLayoutId id="2147483651" r:id="rId3"/>
-    <p:sldLayoutId id="2147483652" r:id="rId4"/>
-    <p:sldLayoutId id="2147483653" r:id="rId5"/>
-    <p:sldLayoutId id="2147483654" r:id="rId6"/>
-    <p:sldLayoutId id="2147483655" r:id="rId7"/>
-    <p:sldLayoutId id="2147483656" r:id="rId8"/>
-    <p:sldLayoutId id="2147483657" r:id="rId9"/>
-    <p:sldLayoutId id="2147483658" r:id="rId10"/>
-    <p:sldLayoutId id="2147483659" r:id="rId11"/>
+    <p:sldLayoutId id="2147483745" r:id="rId1"/>
+    <p:sldLayoutId id="2147483746" r:id="rId2"/>
+    <p:sldLayoutId id="2147483747" r:id="rId3"/>
+    <p:sldLayoutId id="2147483748" r:id="rId4"/>
+    <p:sldLayoutId id="2147483749" r:id="rId5"/>
+    <p:sldLayoutId id="2147483750" r:id="rId6"/>
+    <p:sldLayoutId id="2147483751" r:id="rId7"/>
+    <p:sldLayoutId id="2147483752" r:id="rId8"/>
+    <p:sldLayoutId id="2147483753" r:id="rId9"/>
+    <p:sldLayoutId id="2147483754" r:id="rId10"/>
+    <p:sldLayoutId id="2147483755" r:id="rId11"/>
   </p:sldLayoutIdLst>
   <p:txStyles>
     <p:titleStyle>
-      <a:lvl1pPr algn="ctr" defTabSz="914400" rtl="0" eaLnBrk="1" latinLnBrk="0" hangingPunct="1">
+      <a:lvl1pPr algn="l" rtl="0" eaLnBrk="1" latinLnBrk="0" hangingPunct="1">
         <a:spcBef>
           <a:spcPct val="0"/>
         </a:spcBef>
         <a:buNone/>
-        <a:defRPr sz="4400" kern="1200">
-          <a:solidFill>
-            <a:schemeClr val="tx1"/>
-          </a:solidFill>
+        <a:defRPr kumimoji="0" sz="3800" b="1" kern="1200" cap="all" baseline="0">
+          <a:ln w="500">
+            <a:solidFill>
+              <a:schemeClr val="tx2">
+                <a:shade val="20000"/>
+                <a:satMod val="120000"/>
+              </a:schemeClr>
+            </a:solidFill>
+          </a:ln>
+          <a:gradFill>
+            <a:gsLst>
+              <a:gs pos="0">
+                <a:schemeClr val="accent4">
+                  <a:tint val="13000"/>
+                </a:schemeClr>
+              </a:gs>
+              <a:gs pos="10000">
+                <a:schemeClr val="accent4">
+                  <a:tint val="20000"/>
+                </a:schemeClr>
+              </a:gs>
+              <a:gs pos="49000">
+                <a:schemeClr val="accent4">
+                  <a:tint val="70000"/>
+                </a:schemeClr>
+              </a:gs>
+              <a:gs pos="50000">
+                <a:schemeClr val="accent4">
+                  <a:tint val="97000"/>
+                </a:schemeClr>
+              </a:gs>
+              <a:gs pos="100000">
+                <a:schemeClr val="accent4">
+                  <a:tint val="20000"/>
+                </a:schemeClr>
+              </a:gs>
+            </a:gsLst>
+            <a:lin ang="5400000" scaled="1"/>
+          </a:gradFill>
+          <a:effectLst/>
           <a:latin typeface="+mj-lt"/>
           <a:ea typeface="+mj-ea"/>
           <a:cs typeface="+mj-cs"/>
         </a:defRPr>
       </a:lvl1pPr>
+      <a:extLst/>
     </p:titleStyle>
     <p:bodyStyle>
-      <a:lvl1pPr marL="342900" indent="-342900" algn="l" defTabSz="914400" rtl="0" eaLnBrk="1" latinLnBrk="0" hangingPunct="1">
+      <a:lvl1pPr marL="274320" indent="-274320" algn="l" rtl="0" eaLnBrk="1" latinLnBrk="0" hangingPunct="1">
         <a:spcBef>
-          <a:spcPct val="20000"/>
+          <a:spcPts val="600"/>
         </a:spcBef>
-        <a:buFont typeface="Arial" pitchFamily="34" charset="0"/>
-        <a:buChar char="•"/>
-        <a:defRPr sz="3200" kern="1200">
+        <a:buClr>
+          <a:schemeClr val="tx2"/>
+        </a:buClr>
+        <a:buSzPct val="73000"/>
+        <a:buFont typeface="Wingdings 2"/>
+        <a:buChar char=""/>
+        <a:defRPr kumimoji="0" sz="2600" kern="1200" baseline="0">
           <a:solidFill>
             <a:schemeClr val="tx1"/>
           </a:solidFill>
@@ -2825,13 +3322,180 @@
           <a:cs typeface="+mn-cs"/>
         </a:defRPr>
       </a:lvl1pPr>
-      <a:lvl2pPr marL="742950" indent="-285750" algn="l" defTabSz="914400" rtl="0" eaLnBrk="1" latinLnBrk="0" hangingPunct="1">
+      <a:lvl2pPr marL="521208" indent="-228600" algn="l" rtl="0" eaLnBrk="1" latinLnBrk="0" hangingPunct="1">
+        <a:spcBef>
+          <a:spcPts val="500"/>
+        </a:spcBef>
+        <a:buClr>
+          <a:schemeClr val="accent4"/>
+        </a:buClr>
+        <a:buSzPct val="80000"/>
+        <a:buFont typeface="Wingdings 2"/>
+        <a:buChar char=""/>
+        <a:defRPr kumimoji="0" sz="2300" kern="1200">
+          <a:solidFill>
+            <a:schemeClr val="tx1">
+              <a:tint val="85000"/>
+            </a:schemeClr>
+          </a:solidFill>
+          <a:latin typeface="+mn-lt"/>
+          <a:ea typeface="+mn-ea"/>
+          <a:cs typeface="+mn-cs"/>
+        </a:defRPr>
+      </a:lvl2pPr>
+      <a:lvl3pPr marL="758952" indent="-228600" algn="l" rtl="0" eaLnBrk="1" latinLnBrk="0" hangingPunct="1">
+        <a:spcBef>
+          <a:spcPts val="400"/>
+        </a:spcBef>
+        <a:buClr>
+          <a:schemeClr val="accent4"/>
+        </a:buClr>
+        <a:buSzPct val="60000"/>
+        <a:buFont typeface="Wingdings"/>
+        <a:buChar char=""/>
+        <a:defRPr kumimoji="0" sz="2000" kern="1200">
+          <a:solidFill>
+            <a:schemeClr val="tx1"/>
+          </a:solidFill>
+          <a:latin typeface="+mn-lt"/>
+          <a:ea typeface="+mn-ea"/>
+          <a:cs typeface="+mn-cs"/>
+        </a:defRPr>
+      </a:lvl3pPr>
+      <a:lvl4pPr marL="1005840" indent="-228600" algn="l" rtl="0" eaLnBrk="1" latinLnBrk="0" hangingPunct="1">
         <a:spcBef>
           <a:spcPct val="20000"/>
         </a:spcBef>
-        <a:buFont typeface="Arial" pitchFamily="34" charset="0"/>
-        <a:buChar char="–"/>
-        <a:defRPr sz="2800" kern="1200">
+        <a:buClr>
+          <a:schemeClr val="accent4"/>
+        </a:buClr>
+        <a:buSzPct val="80000"/>
+        <a:buFont typeface="Wingdings 2"/>
+        <a:buChar char=""/>
+        <a:defRPr kumimoji="0" sz="2000" kern="1200">
+          <a:solidFill>
+            <a:schemeClr val="tx1">
+              <a:tint val="85000"/>
+            </a:schemeClr>
+          </a:solidFill>
+          <a:latin typeface="+mn-lt"/>
+          <a:ea typeface="+mn-ea"/>
+          <a:cs typeface="+mn-cs"/>
+        </a:defRPr>
+      </a:lvl4pPr>
+      <a:lvl5pPr marL="1280160" indent="-228600" algn="l" rtl="0" eaLnBrk="1" latinLnBrk="0" hangingPunct="1">
+        <a:spcBef>
+          <a:spcPts val="400"/>
+        </a:spcBef>
+        <a:buClr>
+          <a:schemeClr val="accent4"/>
+        </a:buClr>
+        <a:buSzPct val="70000"/>
+        <a:buFont typeface="Wingdings"/>
+        <a:buChar char=""/>
+        <a:defRPr kumimoji="0" sz="1800" kern="1200">
+          <a:solidFill>
+            <a:schemeClr val="tx1"/>
+          </a:solidFill>
+          <a:latin typeface="+mn-lt"/>
+          <a:ea typeface="+mn-ea"/>
+          <a:cs typeface="+mn-cs"/>
+        </a:defRPr>
+      </a:lvl5pPr>
+      <a:lvl6pPr marL="1472184" indent="-182880" algn="l" rtl="0" eaLnBrk="1" latinLnBrk="0" hangingPunct="1">
+        <a:spcBef>
+          <a:spcPts val="400"/>
+        </a:spcBef>
+        <a:buClr>
+          <a:schemeClr val="accent4"/>
+        </a:buClr>
+        <a:buSzPct val="80000"/>
+        <a:buFont typeface="Wingdings 2"/>
+        <a:buChar char=""/>
+        <a:defRPr kumimoji="0" sz="1800" kern="1200">
+          <a:solidFill>
+            <a:schemeClr val="tx1">
+              <a:tint val="85000"/>
+            </a:schemeClr>
+          </a:solidFill>
+          <a:latin typeface="+mn-lt"/>
+          <a:ea typeface="+mn-ea"/>
+          <a:cs typeface="+mn-cs"/>
+        </a:defRPr>
+      </a:lvl6pPr>
+      <a:lvl7pPr marL="1673352" indent="-182880" algn="l" rtl="0" eaLnBrk="1" latinLnBrk="0" hangingPunct="1">
+        <a:spcBef>
+          <a:spcPct val="20000"/>
+        </a:spcBef>
+        <a:buClr>
+          <a:schemeClr val="accent4"/>
+        </a:buClr>
+        <a:buSzPct val="80000"/>
+        <a:buFont typeface="Wingdings 2"/>
+        <a:buChar char=""/>
+        <a:defRPr kumimoji="0" sz="1600" kern="1200" baseline="0">
+          <a:solidFill>
+            <a:schemeClr val="tx1"/>
+          </a:solidFill>
+          <a:latin typeface="+mn-lt"/>
+          <a:ea typeface="+mn-ea"/>
+          <a:cs typeface="+mn-cs"/>
+        </a:defRPr>
+      </a:lvl7pPr>
+      <a:lvl8pPr marL="1847088" indent="-182880" algn="l" rtl="0" eaLnBrk="1" latinLnBrk="0" hangingPunct="1">
+        <a:spcBef>
+          <a:spcPts val="300"/>
+        </a:spcBef>
+        <a:buClr>
+          <a:schemeClr val="accent4"/>
+        </a:buClr>
+        <a:buSzPct val="100000"/>
+        <a:buChar char="•"/>
+        <a:defRPr kumimoji="0" sz="1600" kern="1200" baseline="0">
+          <a:solidFill>
+            <a:schemeClr val="tx1">
+              <a:tint val="85000"/>
+            </a:schemeClr>
+          </a:solidFill>
+          <a:latin typeface="+mn-lt"/>
+          <a:ea typeface="+mn-ea"/>
+          <a:cs typeface="+mn-cs"/>
+        </a:defRPr>
+      </a:lvl8pPr>
+      <a:lvl9pPr marL="2057400" indent="-182880" algn="l" rtl="0" eaLnBrk="1" latinLnBrk="0" hangingPunct="1">
+        <a:spcBef>
+          <a:spcPct val="20000"/>
+        </a:spcBef>
+        <a:buClr>
+          <a:schemeClr val="accent4"/>
+        </a:buClr>
+        <a:buSzPct val="100000"/>
+        <a:buFont typeface="Wingdings"/>
+        <a:buChar char="§"/>
+        <a:defRPr kumimoji="0" sz="1400" kern="1200" baseline="0">
+          <a:solidFill>
+            <a:schemeClr val="tx1"/>
+          </a:solidFill>
+          <a:latin typeface="+mn-lt"/>
+          <a:ea typeface="+mn-ea"/>
+          <a:cs typeface="+mn-cs"/>
+        </a:defRPr>
+      </a:lvl9pPr>
+      <a:extLst/>
+    </p:bodyStyle>
+    <p:otherStyle>
+      <a:lvl1pPr marL="0" algn="l" rtl="0" eaLnBrk="1" latinLnBrk="0" hangingPunct="1">
+        <a:defRPr kumimoji="0" kern="1200">
+          <a:solidFill>
+            <a:schemeClr val="tx1"/>
+          </a:solidFill>
+          <a:latin typeface="+mn-lt"/>
+          <a:ea typeface="+mn-ea"/>
+          <a:cs typeface="+mn-cs"/>
+        </a:defRPr>
+      </a:lvl1pPr>
+      <a:lvl2pPr marL="457200" algn="l" rtl="0" eaLnBrk="1" latinLnBrk="0" hangingPunct="1">
+        <a:defRPr kumimoji="0" kern="1200">
           <a:solidFill>
             <a:schemeClr val="tx1"/>
           </a:solidFill>
@@ -2840,13 +3504,8 @@
           <a:cs typeface="+mn-cs"/>
         </a:defRPr>
       </a:lvl2pPr>
-      <a:lvl3pPr marL="1143000" indent="-228600" algn="l" defTabSz="914400" rtl="0" eaLnBrk="1" latinLnBrk="0" hangingPunct="1">
-        <a:spcBef>
-          <a:spcPct val="20000"/>
-        </a:spcBef>
-        <a:buFont typeface="Arial" pitchFamily="34" charset="0"/>
-        <a:buChar char="•"/>
-        <a:defRPr sz="2400" kern="1200">
+      <a:lvl3pPr marL="914400" algn="l" rtl="0" eaLnBrk="1" latinLnBrk="0" hangingPunct="1">
+        <a:defRPr kumimoji="0" kern="1200">
           <a:solidFill>
             <a:schemeClr val="tx1"/>
           </a:solidFill>
@@ -2855,13 +3514,8 @@
           <a:cs typeface="+mn-cs"/>
         </a:defRPr>
       </a:lvl3pPr>
-      <a:lvl4pPr marL="1600200" indent="-228600" algn="l" defTabSz="914400" rtl="0" eaLnBrk="1" latinLnBrk="0" hangingPunct="1">
-        <a:spcBef>
-          <a:spcPct val="20000"/>
-        </a:spcBef>
-        <a:buFont typeface="Arial" pitchFamily="34" charset="0"/>
-        <a:buChar char="–"/>
-        <a:defRPr sz="2000" kern="1200">
+      <a:lvl4pPr marL="1371600" algn="l" rtl="0" eaLnBrk="1" latinLnBrk="0" hangingPunct="1">
+        <a:defRPr kumimoji="0" kern="1200">
           <a:solidFill>
             <a:schemeClr val="tx1"/>
           </a:solidFill>
@@ -2870,13 +3524,8 @@
           <a:cs typeface="+mn-cs"/>
         </a:defRPr>
       </a:lvl4pPr>
-      <a:lvl5pPr marL="2057400" indent="-228600" algn="l" defTabSz="914400" rtl="0" eaLnBrk="1" latinLnBrk="0" hangingPunct="1">
-        <a:spcBef>
-          <a:spcPct val="20000"/>
-        </a:spcBef>
-        <a:buFont typeface="Arial" pitchFamily="34" charset="0"/>
-        <a:buChar char="»"/>
-        <a:defRPr sz="2000" kern="1200">
+      <a:lvl5pPr marL="1828800" algn="l" rtl="0" eaLnBrk="1" latinLnBrk="0" hangingPunct="1">
+        <a:defRPr kumimoji="0" kern="1200">
           <a:solidFill>
             <a:schemeClr val="tx1"/>
           </a:solidFill>
@@ -2885,13 +3534,8 @@
           <a:cs typeface="+mn-cs"/>
         </a:defRPr>
       </a:lvl5pPr>
-      <a:lvl6pPr marL="2514600" indent="-228600" algn="l" defTabSz="914400" rtl="0" eaLnBrk="1" latinLnBrk="0" hangingPunct="1">
-        <a:spcBef>
-          <a:spcPct val="20000"/>
-        </a:spcBef>
-        <a:buFont typeface="Arial" pitchFamily="34" charset="0"/>
-        <a:buChar char="•"/>
-        <a:defRPr sz="2000" kern="1200">
+      <a:lvl6pPr marL="2286000" algn="l" rtl="0" eaLnBrk="1" latinLnBrk="0" hangingPunct="1">
+        <a:defRPr kumimoji="0" kern="1200">
           <a:solidFill>
             <a:schemeClr val="tx1"/>
           </a:solidFill>
@@ -2900,13 +3544,8 @@
           <a:cs typeface="+mn-cs"/>
         </a:defRPr>
       </a:lvl6pPr>
-      <a:lvl7pPr marL="2971800" indent="-228600" algn="l" defTabSz="914400" rtl="0" eaLnBrk="1" latinLnBrk="0" hangingPunct="1">
-        <a:spcBef>
-          <a:spcPct val="20000"/>
-        </a:spcBef>
-        <a:buFont typeface="Arial" pitchFamily="34" charset="0"/>
-        <a:buChar char="•"/>
-        <a:defRPr sz="2000" kern="1200">
+      <a:lvl7pPr marL="2743200" algn="l" rtl="0" eaLnBrk="1" latinLnBrk="0" hangingPunct="1">
+        <a:defRPr kumimoji="0" kern="1200">
           <a:solidFill>
             <a:schemeClr val="tx1"/>
           </a:solidFill>
@@ -2915,13 +3554,8 @@
           <a:cs typeface="+mn-cs"/>
         </a:defRPr>
       </a:lvl7pPr>
-      <a:lvl8pPr marL="3429000" indent="-228600" algn="l" defTabSz="914400" rtl="0" eaLnBrk="1" latinLnBrk="0" hangingPunct="1">
-        <a:spcBef>
-          <a:spcPct val="20000"/>
-        </a:spcBef>
-        <a:buFont typeface="Arial" pitchFamily="34" charset="0"/>
-        <a:buChar char="•"/>
-        <a:defRPr sz="2000" kern="1200">
+      <a:lvl8pPr marL="3200400" algn="l" rtl="0" eaLnBrk="1" latinLnBrk="0" hangingPunct="1">
+        <a:defRPr kumimoji="0" kern="1200">
           <a:solidFill>
             <a:schemeClr val="tx1"/>
           </a:solidFill>
@@ -2930,13 +3564,8 @@
           <a:cs typeface="+mn-cs"/>
         </a:defRPr>
       </a:lvl8pPr>
-      <a:lvl9pPr marL="3886200" indent="-228600" algn="l" defTabSz="914400" rtl="0" eaLnBrk="1" latinLnBrk="0" hangingPunct="1">
-        <a:spcBef>
-          <a:spcPct val="20000"/>
-        </a:spcBef>
-        <a:buFont typeface="Arial" pitchFamily="34" charset="0"/>
-        <a:buChar char="•"/>
-        <a:defRPr sz="2000" kern="1200">
+      <a:lvl9pPr marL="3657600" algn="l" rtl="0" eaLnBrk="1" latinLnBrk="0" hangingPunct="1">
+        <a:defRPr kumimoji="0" kern="1200">
           <a:solidFill>
             <a:schemeClr val="tx1"/>
           </a:solidFill>
@@ -2945,101 +3574,7 @@
           <a:cs typeface="+mn-cs"/>
         </a:defRPr>
       </a:lvl9pPr>
-    </p:bodyStyle>
-    <p:otherStyle>
-      <a:defPPr>
-        <a:defRPr lang="en-US"/>
-      </a:defPPr>
-      <a:lvl1pPr marL="0" algn="l" defTabSz="914400" rtl="0" eaLnBrk="1" latinLnBrk="0" hangingPunct="1">
-        <a:defRPr sz="1800" kern="1200">
-          <a:solidFill>
-            <a:schemeClr val="tx1"/>
-          </a:solidFill>
-          <a:latin typeface="+mn-lt"/>
-          <a:ea typeface="+mn-ea"/>
-          <a:cs typeface="+mn-cs"/>
-        </a:defRPr>
-      </a:lvl1pPr>
-      <a:lvl2pPr marL="457200" algn="l" defTabSz="914400" rtl="0" eaLnBrk="1" latinLnBrk="0" hangingPunct="1">
-        <a:defRPr sz="1800" kern="1200">
-          <a:solidFill>
-            <a:schemeClr val="tx1"/>
-          </a:solidFill>
-          <a:latin typeface="+mn-lt"/>
-          <a:ea typeface="+mn-ea"/>
-          <a:cs typeface="+mn-cs"/>
-        </a:defRPr>
-      </a:lvl2pPr>
-      <a:lvl3pPr marL="914400" algn="l" defTabSz="914400" rtl="0" eaLnBrk="1" latinLnBrk="0" hangingPunct="1">
-        <a:defRPr sz="1800" kern="1200">
-          <a:solidFill>
-            <a:schemeClr val="tx1"/>
-          </a:solidFill>
-          <a:latin typeface="+mn-lt"/>
-          <a:ea typeface="+mn-ea"/>
-          <a:cs typeface="+mn-cs"/>
-        </a:defRPr>
-      </a:lvl3pPr>
-      <a:lvl4pPr marL="1371600" algn="l" defTabSz="914400" rtl="0" eaLnBrk="1" latinLnBrk="0" hangingPunct="1">
-        <a:defRPr sz="1800" kern="1200">
-          <a:solidFill>
-            <a:schemeClr val="tx1"/>
-          </a:solidFill>
-          <a:latin typeface="+mn-lt"/>
-          <a:ea typeface="+mn-ea"/>
-          <a:cs typeface="+mn-cs"/>
-        </a:defRPr>
-      </a:lvl4pPr>
-      <a:lvl5pPr marL="1828800" algn="l" defTabSz="914400" rtl="0" eaLnBrk="1" latinLnBrk="0" hangingPunct="1">
-        <a:defRPr sz="1800" kern="1200">
-          <a:solidFill>
-            <a:schemeClr val="tx1"/>
-          </a:solidFill>
-          <a:latin typeface="+mn-lt"/>
-          <a:ea typeface="+mn-ea"/>
-          <a:cs typeface="+mn-cs"/>
-        </a:defRPr>
-      </a:lvl5pPr>
-      <a:lvl6pPr marL="2286000" algn="l" defTabSz="914400" rtl="0" eaLnBrk="1" latinLnBrk="0" hangingPunct="1">
-        <a:defRPr sz="1800" kern="1200">
-          <a:solidFill>
-            <a:schemeClr val="tx1"/>
-          </a:solidFill>
-          <a:latin typeface="+mn-lt"/>
-          <a:ea typeface="+mn-ea"/>
-          <a:cs typeface="+mn-cs"/>
-        </a:defRPr>
-      </a:lvl6pPr>
-      <a:lvl7pPr marL="2743200" algn="l" defTabSz="914400" rtl="0" eaLnBrk="1" latinLnBrk="0" hangingPunct="1">
-        <a:defRPr sz="1800" kern="1200">
-          <a:solidFill>
-            <a:schemeClr val="tx1"/>
-          </a:solidFill>
-          <a:latin typeface="+mn-lt"/>
-          <a:ea typeface="+mn-ea"/>
-          <a:cs typeface="+mn-cs"/>
-        </a:defRPr>
-      </a:lvl7pPr>
-      <a:lvl8pPr marL="3200400" algn="l" defTabSz="914400" rtl="0" eaLnBrk="1" latinLnBrk="0" hangingPunct="1">
-        <a:defRPr sz="1800" kern="1200">
-          <a:solidFill>
-            <a:schemeClr val="tx1"/>
-          </a:solidFill>
-          <a:latin typeface="+mn-lt"/>
-          <a:ea typeface="+mn-ea"/>
-          <a:cs typeface="+mn-cs"/>
-        </a:defRPr>
-      </a:lvl8pPr>
-      <a:lvl9pPr marL="3657600" algn="l" defTabSz="914400" rtl="0" eaLnBrk="1" latinLnBrk="0" hangingPunct="1">
-        <a:defRPr sz="1800" kern="1200">
-          <a:solidFill>
-            <a:schemeClr val="tx1"/>
-          </a:solidFill>
-          <a:latin typeface="+mn-lt"/>
-          <a:ea typeface="+mn-ea"/>
-          <a:cs typeface="+mn-cs"/>
-        </a:defRPr>
-      </a:lvl9pPr>
+      <a:extLst/>
     </p:otherStyle>
   </p:txStyles>
 </p:sldMaster>
@@ -3102,7 +3637,9 @@
         </p:nvSpPr>
         <p:spPr/>
         <p:txBody>
-          <a:bodyPr/>
+          <a:bodyPr>
+            <a:normAutofit/>
+          </a:bodyPr>
           <a:lstStyle/>
           <a:p>
             <a:r>
@@ -3168,12 +3705,14 @@
         </p:nvSpPr>
         <p:spPr>
           <a:xfrm>
-            <a:off x="3124200" y="3352800"/>
-            <a:ext cx="3352800" cy="719138"/>
-          </a:xfrm>
-        </p:spPr>
-        <p:txBody>
-          <a:bodyPr/>
+            <a:off x="762000" y="3733800"/>
+            <a:ext cx="3352800" cy="414338"/>
+          </a:xfrm>
+        </p:spPr>
+        <p:txBody>
+          <a:bodyPr>
+            <a:normAutofit fontScale="90000"/>
+          </a:bodyPr>
           <a:lstStyle/>
           <a:p>
             <a:r>
@@ -3181,6 +3720,47 @@
               <a:t>Kashmir Product and Travel </a:t>
             </a:r>
             <a:endParaRPr lang="en-US" dirty="0"/>
+          </a:p>
+        </p:txBody>
+      </p:sp>
+      <p:sp>
+        <p:nvSpPr>
+          <p:cNvPr id="4" name="Text Placeholder 3"/>
+          <p:cNvSpPr>
+            <a:spLocks noGrp="1"/>
+          </p:cNvSpPr>
+          <p:nvPr>
+            <p:ph type="body" sz="half" idx="2"/>
+          </p:nvPr>
+        </p:nvSpPr>
+        <p:spPr>
+          <a:xfrm>
+            <a:off x="990600" y="4343400"/>
+            <a:ext cx="1447800" cy="804862"/>
+          </a:xfrm>
+        </p:spPr>
+        <p:txBody>
+          <a:bodyPr>
+            <a:normAutofit/>
+          </a:bodyPr>
+          <a:lstStyle/>
+          <a:p>
+            <a:r>
+              <a:rPr lang="en-US" i="1" dirty="0" smtClean="0">
+                <a:solidFill>
+                  <a:schemeClr val="bg1"/>
+                </a:solidFill>
+              </a:rPr>
+              <a:t>Craft  and </a:t>
+            </a:r>
+            <a:r>
+              <a:rPr lang="en-US" dirty="0" smtClean="0">
+                <a:solidFill>
+                  <a:schemeClr val="bg1"/>
+                </a:solidFill>
+              </a:rPr>
+              <a:t>More</a:t>
+            </a:r>
           </a:p>
         </p:txBody>
       </p:sp>
@@ -3203,41 +3783,11 @@
         </p:blipFill>
         <p:spPr>
           <a:xfrm>
-            <a:off x="1905000" y="609600"/>
+            <a:off x="3276600" y="228600"/>
             <a:ext cx="5486400" cy="2892425"/>
           </a:xfrm>
         </p:spPr>
       </p:pic>
-      <p:sp>
-        <p:nvSpPr>
-          <p:cNvPr id="4" name="Text Placeholder 3"/>
-          <p:cNvSpPr>
-            <a:spLocks noGrp="1"/>
-          </p:cNvSpPr>
-          <p:nvPr>
-            <p:ph type="body" sz="half" idx="2"/>
-          </p:nvPr>
-        </p:nvSpPr>
-        <p:spPr>
-          <a:xfrm>
-            <a:off x="3962400" y="4038600"/>
-            <a:ext cx="1447800" cy="804862"/>
-          </a:xfrm>
-        </p:spPr>
-        <p:txBody>
-          <a:bodyPr>
-            <a:normAutofit/>
-          </a:bodyPr>
-          <a:lstStyle/>
-          <a:p>
-            <a:r>
-              <a:rPr lang="en-US" dirty="0" smtClean="0"/>
-              <a:t>Craft  and More</a:t>
-            </a:r>
-            <a:endParaRPr lang="en-US" dirty="0" smtClean="0"/>
-          </a:p>
-        </p:txBody>
-      </p:sp>
     </p:spTree>
   </p:cSld>
   <p:clrMapOvr>
@@ -3282,7 +3832,7 @@
         </p:nvSpPr>
         <p:spPr>
           <a:xfrm>
-            <a:off x="-1295400" y="609600"/>
+            <a:off x="533400" y="304800"/>
             <a:ext cx="8229600" cy="1143000"/>
           </a:xfrm>
         </p:spPr>
@@ -3382,61 +3932,56 @@
           </a:p>
         </p:txBody>
       </p:sp>
-      <p:pic>
-        <p:nvPicPr>
-          <p:cNvPr id="5" name="Picture Placeholder 4" descr="IMG_4708-ANIMATION.gif"/>
-          <p:cNvPicPr>
-            <a:picLocks noGrp="1" noChangeAspect="1"/>
-          </p:cNvPicPr>
+      <p:sp>
+        <p:nvSpPr>
+          <p:cNvPr id="4" name="Text Placeholder 3"/>
+          <p:cNvSpPr>
+            <a:spLocks noGrp="1"/>
+          </p:cNvSpPr>
+          <p:nvPr>
+            <p:ph type="body" sz="half" idx="2"/>
+          </p:nvPr>
+        </p:nvSpPr>
+        <p:spPr/>
+        <p:txBody>
+          <a:bodyPr/>
+          <a:lstStyle/>
+          <a:p>
+            <a:endParaRPr lang="en-US"/>
+          </a:p>
+        </p:txBody>
+      </p:sp>
+      <p:sp>
+        <p:nvSpPr>
+          <p:cNvPr id="12" name="Picture Placeholder 11"/>
+          <p:cNvSpPr>
+            <a:spLocks noGrp="1"/>
+          </p:cNvSpPr>
           <p:nvPr>
             <p:ph type="pic" idx="1"/>
           </p:nvPr>
-        </p:nvPicPr>
-        <p:blipFill>
-          <a:blip r:embed="rId2"/>
-          <a:srcRect t="16264" b="16264"/>
-          <a:stretch>
-            <a:fillRect/>
-          </a:stretch>
-        </p:blipFill>
-        <p:spPr>
-          <a:xfrm>
-            <a:off x="1905000" y="1143000"/>
-            <a:ext cx="4876800" cy="3203575"/>
-          </a:xfrm>
-        </p:spPr>
-      </p:pic>
-      <p:sp>
-        <p:nvSpPr>
-          <p:cNvPr id="4" name="Text Placeholder 3"/>
-          <p:cNvSpPr>
-            <a:spLocks noGrp="1"/>
-          </p:cNvSpPr>
-          <p:nvPr>
-            <p:ph type="body" sz="half" idx="2"/>
-          </p:nvPr>
         </p:nvSpPr>
         <p:spPr/>
-        <p:txBody>
-          <a:bodyPr/>
-          <a:lstStyle/>
-          <a:p>
-            <a:endParaRPr lang="en-US"/>
-          </a:p>
-        </p:txBody>
       </p:sp>
     </p:spTree>
   </p:cSld>
   <p:clrMapOvr>
     <a:masterClrMapping/>
   </p:clrMapOvr>
+  <p:timing>
+    <p:tnLst>
+      <p:par>
+        <p:cTn id="1" dur="indefinite" restart="never" nodeType="tmRoot"/>
+      </p:par>
+    </p:tnLst>
+  </p:timing>
 </p:sld>
 </file>
 
 <file path=ppt/theme/theme1.xml><?xml version="1.0" encoding="utf-8"?>
-<a:theme xmlns:a="http://schemas.openxmlformats.org/drawingml/2006/main" name="Office Theme">
+<a:theme xmlns:a="http://schemas.openxmlformats.org/drawingml/2006/main" name="Opulent">
   <a:themeElements>
-    <a:clrScheme name="Office">
+    <a:clrScheme name="Opulent">
       <a:dk1>
         <a:sysClr val="windowText" lastClr="000000"/>
       </a:dk1>
@@ -3444,43 +3989,77 @@
         <a:sysClr val="window" lastClr="FFFFFF"/>
       </a:lt1>
       <a:dk2>
-        <a:srgbClr val="1F497D"/>
+        <a:srgbClr val="B13F9A"/>
       </a:dk2>
       <a:lt2>
-        <a:srgbClr val="EEECE1"/>
+        <a:srgbClr val="F4E7ED"/>
       </a:lt2>
       <a:accent1>
-        <a:srgbClr val="4F81BD"/>
+        <a:srgbClr val="B83D68"/>
       </a:accent1>
       <a:accent2>
-        <a:srgbClr val="C0504D"/>
+        <a:srgbClr val="AC66BB"/>
       </a:accent2>
       <a:accent3>
-        <a:srgbClr val="9BBB59"/>
+        <a:srgbClr val="DE6C36"/>
       </a:accent3>
       <a:accent4>
-        <a:srgbClr val="8064A2"/>
+        <a:srgbClr val="F9B639"/>
       </a:accent4>
       <a:accent5>
-        <a:srgbClr val="4BACC6"/>
+        <a:srgbClr val="CF6DA4"/>
       </a:accent5>
       <a:accent6>
-        <a:srgbClr val="F79646"/>
+        <a:srgbClr val="FA8D3D"/>
       </a:accent6>
       <a:hlink>
-        <a:srgbClr val="0000FF"/>
+        <a:srgbClr val="FFDE66"/>
       </a:hlink>
       <a:folHlink>
-        <a:srgbClr val="800080"/>
+        <a:srgbClr val="D490C5"/>
       </a:folHlink>
     </a:clrScheme>
-    <a:fontScheme name="Office">
+    <a:fontScheme name="Office Classic">
       <a:majorFont>
-        <a:latin typeface="Calibri"/>
+        <a:latin typeface="Arial"/>
         <a:ea typeface=""/>
         <a:cs typeface=""/>
         <a:font script="Jpan" typeface="ＭＳ Ｐゴシック"/>
-        <a:font script="Hang" typeface="맑은 고딕"/>
+        <a:font script="Hang" typeface="돋움"/>
+        <a:font script="Hans" typeface="黑体"/>
+        <a:font script="Hant" typeface="微軟正黑體"/>
+        <a:font script="Arab" typeface="Arial"/>
+        <a:font script="Hebr" typeface="Arial"/>
+        <a:font script="Thai" typeface="Cordia New"/>
+        <a:font script="Ethi" typeface="Nyala"/>
+        <a:font script="Beng" typeface="Vrinda"/>
+        <a:font script="Gujr" typeface="Shruti"/>
+        <a:font script="Khmr" typeface="DaunPenh"/>
+        <a:font script="Knda" typeface="Tunga"/>
+        <a:font script="Guru" typeface="Raavi"/>
+        <a:font script="Cans" typeface="Euphemia"/>
+        <a:font script="Cher" typeface="Plantagenet Cherokee"/>
+        <a:font script="Yiii" typeface="Microsoft Yi Baiti"/>
+        <a:font script="Tibt" typeface="Microsoft Himalaya"/>
+        <a:font script="Thaa" typeface="MV Boli"/>
+        <a:font script="Deva" typeface="Mangal"/>
+        <a:font script="Telu" typeface="Gautami"/>
+        <a:font script="Taml" typeface="Latha"/>
+        <a:font script="Syrc" typeface="Estrangelo Edessa"/>
+        <a:font script="Orya" typeface="Kalinga"/>
+        <a:font script="Mlym" typeface="Kartika"/>
+        <a:font script="Laoo" typeface="DokChampa"/>
+        <a:font script="Sinh" typeface="Iskoola Pota"/>
+        <a:font script="Mong" typeface="Mongolian Baiti"/>
+        <a:font script="Viet" typeface="Arial"/>
+        <a:font script="Uigh" typeface="Microsoft Uighur"/>
+      </a:majorFont>
+      <a:minorFont>
+        <a:latin typeface="Times New Roman"/>
+        <a:ea typeface=""/>
+        <a:cs typeface=""/>
+        <a:font script="Jpan" typeface="ＭＳ Ｐ明朝"/>
+        <a:font script="Hang" typeface="바탕"/>
         <a:font script="Hans" typeface="宋体"/>
         <a:font script="Hant" typeface="新細明體"/>
         <a:font script="Arab" typeface="Times New Roman"/>
@@ -3508,43 +4087,9 @@
         <a:font script="Mong" typeface="Mongolian Baiti"/>
         <a:font script="Viet" typeface="Times New Roman"/>
         <a:font script="Uigh" typeface="Microsoft Uighur"/>
-      </a:majorFont>
-      <a:minorFont>
-        <a:latin typeface="Calibri"/>
-        <a:ea typeface=""/>
-        <a:cs typeface=""/>
-        <a:font script="Jpan" typeface="ＭＳ Ｐゴシック"/>
-        <a:font script="Hang" typeface="맑은 고딕"/>
-        <a:font script="Hans" typeface="宋体"/>
-        <a:font script="Hant" typeface="新細明體"/>
-        <a:font script="Arab" typeface="Arial"/>
-        <a:font script="Hebr" typeface="Arial"/>
-        <a:font script="Thai" typeface="Cordia New"/>
-        <a:font script="Ethi" typeface="Nyala"/>
-        <a:font script="Beng" typeface="Vrinda"/>
-        <a:font script="Gujr" typeface="Shruti"/>
-        <a:font script="Khmr" typeface="DaunPenh"/>
-        <a:font script="Knda" typeface="Tunga"/>
-        <a:font script="Guru" typeface="Raavi"/>
-        <a:font script="Cans" typeface="Euphemia"/>
-        <a:font script="Cher" typeface="Plantagenet Cherokee"/>
-        <a:font script="Yiii" typeface="Microsoft Yi Baiti"/>
-        <a:font script="Tibt" typeface="Microsoft Himalaya"/>
-        <a:font script="Thaa" typeface="MV Boli"/>
-        <a:font script="Deva" typeface="Mangal"/>
-        <a:font script="Telu" typeface="Gautami"/>
-        <a:font script="Taml" typeface="Latha"/>
-        <a:font script="Syrc" typeface="Estrangelo Edessa"/>
-        <a:font script="Orya" typeface="Kalinga"/>
-        <a:font script="Mlym" typeface="Kartika"/>
-        <a:font script="Laoo" typeface="DokChampa"/>
-        <a:font script="Sinh" typeface="Iskoola Pota"/>
-        <a:font script="Mong" typeface="Mongolian Baiti"/>
-        <a:font script="Viet" typeface="Arial"/>
-        <a:font script="Uigh" typeface="Microsoft Uighur"/>
       </a:minorFont>
     </a:fontScheme>
-    <a:fmtScheme name="Office">
+    <a:fmtScheme name="Urban">
       <a:fillStyleLst>
         <a:solidFill>
           <a:schemeClr val="phClr"/>
@@ -3553,66 +4098,66 @@
           <a:gsLst>
             <a:gs pos="0">
               <a:schemeClr val="phClr">
-                <a:tint val="50000"/>
-                <a:satMod val="300000"/>
+                <a:tint val="1000"/>
+                <a:satMod val="255000"/>
               </a:schemeClr>
             </a:gs>
-            <a:gs pos="35000">
+            <a:gs pos="55000">
               <a:schemeClr val="phClr">
-                <a:tint val="37000"/>
-                <a:satMod val="300000"/>
+                <a:tint val="12000"/>
+                <a:satMod val="255000"/>
               </a:schemeClr>
             </a:gs>
             <a:gs pos="100000">
               <a:schemeClr val="phClr">
-                <a:tint val="15000"/>
-                <a:satMod val="350000"/>
+                <a:tint val="45000"/>
+                <a:satMod val="250000"/>
               </a:schemeClr>
             </a:gs>
           </a:gsLst>
-          <a:lin ang="16200000" scaled="1"/>
+          <a:path path="circle">
+            <a:fillToRect l="-40000" t="-90000" r="140000" b="190000"/>
+          </a:path>
         </a:gradFill>
         <a:gradFill rotWithShape="1">
           <a:gsLst>
             <a:gs pos="0">
               <a:schemeClr val="phClr">
-                <a:shade val="51000"/>
-                <a:satMod val="130000"/>
+                <a:tint val="43000"/>
+                <a:satMod val="165000"/>
               </a:schemeClr>
             </a:gs>
-            <a:gs pos="80000">
+            <a:gs pos="55000">
               <a:schemeClr val="phClr">
-                <a:shade val="93000"/>
-                <a:satMod val="130000"/>
+                <a:tint val="83000"/>
+                <a:satMod val="155000"/>
               </a:schemeClr>
             </a:gs>
             <a:gs pos="100000">
               <a:schemeClr val="phClr">
-                <a:shade val="94000"/>
-                <a:satMod val="135000"/>
+                <a:shade val="85000"/>
               </a:schemeClr>
             </a:gs>
           </a:gsLst>
-          <a:lin ang="16200000" scaled="0"/>
+          <a:path path="circle">
+            <a:fillToRect l="-40000" t="-90000" r="140000" b="190000"/>
+          </a:path>
         </a:gradFill>
       </a:fillStyleLst>
       <a:lnStyleLst>
         <a:ln w="9525" cap="flat" cmpd="sng" algn="ctr">
           <a:solidFill>
-            <a:schemeClr val="phClr">
-              <a:shade val="95000"/>
-              <a:satMod val="105000"/>
-            </a:schemeClr>
+            <a:schemeClr val="phClr"/>
           </a:solidFill>
           <a:prstDash val="solid"/>
         </a:ln>
-        <a:ln w="25400" cap="flat" cmpd="sng" algn="ctr">
+        <a:ln w="19050" cap="flat" cmpd="sng" algn="ctr">
           <a:solidFill>
             <a:schemeClr val="phClr"/>
           </a:solidFill>
           <a:prstDash val="solid"/>
         </a:ln>
-        <a:ln w="38100" cap="flat" cmpd="sng" algn="ctr">
+        <a:ln w="31750" cap="flat" cmpd="sng" algn="ctr">
           <a:solidFill>
             <a:schemeClr val="phClr"/>
           </a:solidFill>
@@ -3622,40 +4167,45 @@
       <a:effectStyleLst>
         <a:effectStyle>
           <a:effectLst>
-            <a:outerShdw blurRad="40000" dist="20000" dir="5400000" rotWithShape="0">
+            <a:outerShdw blurRad="51500" dist="25400" dir="5400000" rotWithShape="0">
               <a:srgbClr val="000000">
-                <a:alpha val="38000"/>
+                <a:alpha val="40000"/>
               </a:srgbClr>
             </a:outerShdw>
           </a:effectLst>
         </a:effectStyle>
         <a:effectStyle>
           <a:effectLst>
-            <a:outerShdw blurRad="40000" dist="23000" dir="5400000" rotWithShape="0">
+            <a:outerShdw blurRad="50800" dist="25400" dir="5400000" rotWithShape="0">
               <a:srgbClr val="000000">
-                <a:alpha val="35000"/>
+                <a:alpha val="45000"/>
               </a:srgbClr>
             </a:outerShdw>
           </a:effectLst>
         </a:effectStyle>
         <a:effectStyle>
           <a:effectLst>
-            <a:outerShdw blurRad="40000" dist="23000" dir="5400000" rotWithShape="0">
+            <a:outerShdw blurRad="50800" dist="25400" dir="5400000" rotWithShape="0">
               <a:srgbClr val="000000">
-                <a:alpha val="35000"/>
+                <a:alpha val="45000"/>
               </a:srgbClr>
             </a:outerShdw>
           </a:effectLst>
           <a:scene3d>
-            <a:camera prst="orthographicFront">
+            <a:camera prst="orthographicFront" fov="0">
               <a:rot lat="0" lon="0" rev="0"/>
             </a:camera>
-            <a:lightRig rig="threePt" dir="t">
-              <a:rot lat="0" lon="0" rev="1200000"/>
+            <a:lightRig rig="flat" dir="t">
+              <a:rot lat="0" lon="0" rev="20040000"/>
             </a:lightRig>
           </a:scene3d>
-          <a:sp3d>
-            <a:bevelT w="63500" h="25400"/>
+          <a:sp3d contourW="12700" prstMaterial="dkEdge">
+            <a:bevelT w="25400" h="38100" prst="convex"/>
+            <a:contourClr>
+              <a:schemeClr val="phClr">
+                <a:satMod val="115000"/>
+              </a:schemeClr>
+            </a:contourClr>
           </a:sp3d>
         </a:effectStyle>
       </a:effectStyleLst>
@@ -3667,40 +4217,14 @@
           <a:gsLst>
             <a:gs pos="0">
               <a:schemeClr val="phClr">
-                <a:tint val="40000"/>
-                <a:satMod val="350000"/>
-              </a:schemeClr>
-            </a:gs>
-            <a:gs pos="40000">
-              <a:schemeClr val="phClr">
-                <a:tint val="45000"/>
-                <a:shade val="99000"/>
-                <a:satMod val="350000"/>
+                <a:tint val="78000"/>
+                <a:satMod val="220000"/>
               </a:schemeClr>
             </a:gs>
             <a:gs pos="100000">
               <a:schemeClr val="phClr">
-                <a:shade val="20000"/>
-                <a:satMod val="255000"/>
-              </a:schemeClr>
-            </a:gs>
-          </a:gsLst>
-          <a:path path="circle">
-            <a:fillToRect l="50000" t="-80000" r="50000" b="180000"/>
-          </a:path>
-        </a:gradFill>
-        <a:gradFill rotWithShape="1">
-          <a:gsLst>
-            <a:gs pos="0">
-              <a:schemeClr val="phClr">
-                <a:tint val="80000"/>
-                <a:satMod val="300000"/>
-              </a:schemeClr>
-            </a:gs>
-            <a:gs pos="100000">
-              <a:schemeClr val="phClr">
-                <a:shade val="30000"/>
-                <a:satMod val="200000"/>
+                <a:shade val="35000"/>
+                <a:satMod val="155000"/>
               </a:schemeClr>
             </a:gs>
           </a:gsLst>
@@ -3708,6 +4232,21 @@
             <a:fillToRect l="50000" t="50000" r="50000" b="50000"/>
           </a:path>
         </a:gradFill>
+        <a:blipFill>
+          <a:blip xmlns:r="http://schemas.openxmlformats.org/officeDocument/2006/relationships" r:embed="rId1">
+            <a:duotone>
+              <a:schemeClr val="phClr">
+                <a:shade val="60000"/>
+                <a:satMod val="180000"/>
+              </a:schemeClr>
+              <a:schemeClr val="phClr">
+                <a:tint val="500"/>
+                <a:satMod val="150000"/>
+              </a:schemeClr>
+            </a:duotone>
+          </a:blip>
+          <a:tile tx="0" ty="0" sx="50000" sy="50000" flip="none" algn="tl"/>
+        </a:blipFill>
       </a:bgFillStyleLst>
     </a:fmtScheme>
   </a:themeElements>

</xml_diff>